<commit_message>
fix: PPTX corrige 3 manques grille eval - schema SI interactions, archi logique fleches, bilan groupe
</commit_message>
<xml_diff>
--- a/07-presentation/BricoLoc2_Presentation.pptx
+++ b/07-presentation/BricoLoc2_Presentation.pptx
@@ -5071,7 +5071,7 @@
         <p:spPr>
           <a:xfrm>
             <a:off x="731520" y="365760"/>
-            <a:ext cx="7315200" cy="640080"/>
+            <a:ext cx="9144000" cy="640080"/>
           </a:xfrm>
           <a:prstGeom prst="rect">
             <a:avLst/>
@@ -6048,8 +6048,8 @@
         </p:nvSpPr>
         <p:spPr>
           <a:xfrm>
-            <a:off x="1828800" y="1188720"/>
-            <a:ext cx="8229600" cy="868680"/>
+            <a:off x="1828800" y="1097280"/>
+            <a:ext cx="8229600" cy="640080"/>
           </a:xfrm>
           <a:prstGeom prst="roundRect">
             <a:avLst/>
@@ -6094,8 +6094,8 @@
         </p:nvSpPr>
         <p:spPr>
           <a:xfrm>
-            <a:off x="2103120" y="1261872"/>
-            <a:ext cx="7315200" cy="365760"/>
+            <a:off x="2011680" y="1143000"/>
+            <a:ext cx="7772400" cy="274320"/>
           </a:xfrm>
           <a:prstGeom prst="rect">
             <a:avLst/>
@@ -6109,7 +6109,7 @@
           <a:lstStyle/>
           <a:p>
             <a:pPr algn="l">
-              <a:defRPr sz="1800" b="1">
+              <a:defRPr sz="1400" b="1">
                 <a:solidFill>
                   <a:srgbClr val="0096D6"/>
                 </a:solidFill>
@@ -6117,21 +6117,65 @@
               </a:defRPr>
             </a:pPr>
             <a:r>
-              <a:t>🌐  Couche Clients</a:t>
-            </a:r>
-          </a:p>
-        </p:txBody>
-      </p:sp>
-      <p:sp>
-        <p:nvSpPr>
-          <p:cNvPr id="6" name="TextBox 5"/>
-          <p:cNvSpPr txBox="1"/>
-          <p:nvPr/>
-        </p:nvSpPr>
-        <p:spPr>
-          <a:xfrm>
-            <a:off x="2103120" y="1627632"/>
-            <a:ext cx="7315200" cy="365760"/>
+              <a:t>🌐 Couche Clients — Web · Mobile · Partenaires · Salariés SSO</a:t>
+            </a:r>
+          </a:p>
+        </p:txBody>
+      </p:sp>
+      <p:sp>
+        <p:nvSpPr>
+          <p:cNvPr id="6" name="Down Arrow 5"/>
+          <p:cNvSpPr/>
+          <p:nvPr/>
+        </p:nvSpPr>
+        <p:spPr>
+          <a:xfrm>
+            <a:off x="5852160" y="1755648"/>
+            <a:ext cx="365760" cy="320040"/>
+          </a:xfrm>
+          <a:prstGeom prst="downArrow">
+            <a:avLst/>
+          </a:prstGeom>
+          <a:solidFill>
+            <a:srgbClr val="0096D6"/>
+          </a:solidFill>
+          <a:ln>
+            <a:noFill/>
+          </a:ln>
+          <a:effectLst/>
+        </p:spPr>
+        <p:style>
+          <a:lnRef idx="1">
+            <a:schemeClr val="accent1"/>
+          </a:lnRef>
+          <a:fillRef idx="3">
+            <a:schemeClr val="accent1"/>
+          </a:fillRef>
+          <a:effectRef idx="2">
+            <a:schemeClr val="accent1"/>
+          </a:effectRef>
+          <a:fontRef idx="minor">
+            <a:schemeClr val="lt1"/>
+          </a:fontRef>
+        </p:style>
+        <p:txBody>
+          <a:bodyPr rtlCol="0" anchor="ctr"/>
+          <a:lstStyle/>
+          <a:p>
+            <a:pPr algn="ctr"/>
+          </a:p>
+        </p:txBody>
+      </p:sp>
+      <p:sp>
+        <p:nvSpPr>
+          <p:cNvPr id="7" name="TextBox 6"/>
+          <p:cNvSpPr txBox="1"/>
+          <p:nvPr/>
+        </p:nvSpPr>
+        <p:spPr>
+          <a:xfrm>
+            <a:off x="6309360" y="1755648"/>
+            <a:ext cx="1371600" cy="274320"/>
           </a:xfrm>
           <a:prstGeom prst="rect">
             <a:avLst/>
@@ -6145,51 +6189,15 @@
           <a:lstStyle/>
           <a:p>
             <a:pPr algn="l">
-              <a:defRPr sz="1200" b="0">
-                <a:solidFill>
-                  <a:srgbClr val="CCCCCC"/>
-                </a:solidFill>
-                <a:latin typeface="Segoe UI"/>
-              </a:defRPr>
-            </a:pPr>
-            <a:r>
-              <a:t>Web · Mobile · Partenaires · Salariés SSO</a:t>
-            </a:r>
-          </a:p>
-        </p:txBody>
-      </p:sp>
-      <p:sp>
-        <p:nvSpPr>
-          <p:cNvPr id="7" name="TextBox 6"/>
-          <p:cNvSpPr txBox="1"/>
-          <p:nvPr/>
-        </p:nvSpPr>
-        <p:spPr>
-          <a:xfrm>
-            <a:off x="5486400" y="2011680"/>
-            <a:ext cx="914400" cy="274320"/>
-          </a:xfrm>
-          <a:prstGeom prst="rect">
-            <a:avLst/>
-          </a:prstGeom>
-          <a:noFill/>
-        </p:spPr>
-        <p:txBody>
-          <a:bodyPr wrap="square">
-            <a:spAutoFit/>
-          </a:bodyPr>
-          <a:lstStyle/>
-          <a:p>
-            <a:pPr algn="ctr">
-              <a:defRPr sz="1600" b="0">
-                <a:solidFill>
-                  <a:srgbClr val="AAAABB"/>
-                </a:solidFill>
-                <a:latin typeface="Segoe UI"/>
-              </a:defRPr>
-            </a:pPr>
-            <a:r>
-              <a:t>▼</a:t>
+              <a:defRPr sz="1000" b="1">
+                <a:solidFill>
+                  <a:srgbClr val="0096D6"/>
+                </a:solidFill>
+                <a:latin typeface="Segoe UI"/>
+              </a:defRPr>
+            </a:pPr>
+            <a:r>
+              <a:t>HTTPS</a:t>
             </a:r>
           </a:p>
         </p:txBody>
@@ -6202,8 +6210,8 @@
         </p:nvSpPr>
         <p:spPr>
           <a:xfrm>
-            <a:off x="1828800" y="2240280"/>
-            <a:ext cx="8229600" cy="868680"/>
+            <a:off x="1828800" y="2103120"/>
+            <a:ext cx="8229600" cy="640080"/>
           </a:xfrm>
           <a:prstGeom prst="roundRect">
             <a:avLst/>
@@ -6248,8 +6256,8 @@
         </p:nvSpPr>
         <p:spPr>
           <a:xfrm>
-            <a:off x="2103120" y="2313432"/>
-            <a:ext cx="7315200" cy="365760"/>
+            <a:off x="2011680" y="2148840"/>
+            <a:ext cx="7772400" cy="274320"/>
           </a:xfrm>
           <a:prstGeom prst="rect">
             <a:avLst/>
@@ -6263,7 +6271,7 @@
           <a:lstStyle/>
           <a:p>
             <a:pPr algn="l">
-              <a:defRPr sz="1800" b="1">
+              <a:defRPr sz="1400" b="1">
                 <a:solidFill>
                   <a:srgbClr val="00B4D8"/>
                 </a:solidFill>
@@ -6271,21 +6279,65 @@
               </a:defRPr>
             </a:pPr>
             <a:r>
-              <a:t>🔒  API Gateway</a:t>
-            </a:r>
-          </a:p>
-        </p:txBody>
-      </p:sp>
-      <p:sp>
-        <p:nvSpPr>
-          <p:cNvPr id="10" name="TextBox 9"/>
-          <p:cNvSpPr txBox="1"/>
-          <p:nvPr/>
-        </p:nvSpPr>
-        <p:spPr>
-          <a:xfrm>
-            <a:off x="2103120" y="2679192"/>
-            <a:ext cx="7315200" cy="365760"/>
+              <a:t>🔒 API Gateway — Spring Cloud Gateway — JWT · Rate Limit · TLS · Routage /api/v1/</a:t>
+            </a:r>
+          </a:p>
+        </p:txBody>
+      </p:sp>
+      <p:sp>
+        <p:nvSpPr>
+          <p:cNvPr id="10" name="Down Arrow 9"/>
+          <p:cNvSpPr/>
+          <p:nvPr/>
+        </p:nvSpPr>
+        <p:spPr>
+          <a:xfrm>
+            <a:off x="5852160" y="2761488"/>
+            <a:ext cx="365760" cy="320040"/>
+          </a:xfrm>
+          <a:prstGeom prst="downArrow">
+            <a:avLst/>
+          </a:prstGeom>
+          <a:solidFill>
+            <a:srgbClr val="00B4D8"/>
+          </a:solidFill>
+          <a:ln>
+            <a:noFill/>
+          </a:ln>
+          <a:effectLst/>
+        </p:spPr>
+        <p:style>
+          <a:lnRef idx="1">
+            <a:schemeClr val="accent1"/>
+          </a:lnRef>
+          <a:fillRef idx="3">
+            <a:schemeClr val="accent1"/>
+          </a:fillRef>
+          <a:effectRef idx="2">
+            <a:schemeClr val="accent1"/>
+          </a:effectRef>
+          <a:fontRef idx="minor">
+            <a:schemeClr val="lt1"/>
+          </a:fontRef>
+        </p:style>
+        <p:txBody>
+          <a:bodyPr rtlCol="0" anchor="ctr"/>
+          <a:lstStyle/>
+          <a:p>
+            <a:pPr algn="ctr"/>
+          </a:p>
+        </p:txBody>
+      </p:sp>
+      <p:sp>
+        <p:nvSpPr>
+          <p:cNvPr id="11" name="TextBox 10"/>
+          <p:cNvSpPr txBox="1"/>
+          <p:nvPr/>
+        </p:nvSpPr>
+        <p:spPr>
+          <a:xfrm>
+            <a:off x="6309360" y="2761488"/>
+            <a:ext cx="2286000" cy="274320"/>
           </a:xfrm>
           <a:prstGeom prst="rect">
             <a:avLst/>
@@ -6299,51 +6351,15 @@
           <a:lstStyle/>
           <a:p>
             <a:pPr algn="l">
-              <a:defRPr sz="1200" b="0">
-                <a:solidFill>
-                  <a:srgbClr val="CCCCCC"/>
-                </a:solidFill>
-                <a:latin typeface="Segoe UI"/>
-              </a:defRPr>
-            </a:pPr>
-            <a:r>
-              <a:t>Spring Cloud Gateway — JWT · Rate Limit · TLS · Routage</a:t>
-            </a:r>
-          </a:p>
-        </p:txBody>
-      </p:sp>
-      <p:sp>
-        <p:nvSpPr>
-          <p:cNvPr id="11" name="TextBox 10"/>
-          <p:cNvSpPr txBox="1"/>
-          <p:nvPr/>
-        </p:nvSpPr>
-        <p:spPr>
-          <a:xfrm>
-            <a:off x="5486400" y="3063240"/>
-            <a:ext cx="914400" cy="274320"/>
-          </a:xfrm>
-          <a:prstGeom prst="rect">
-            <a:avLst/>
-          </a:prstGeom>
-          <a:noFill/>
-        </p:spPr>
-        <p:txBody>
-          <a:bodyPr wrap="square">
-            <a:spAutoFit/>
-          </a:bodyPr>
-          <a:lstStyle/>
-          <a:p>
-            <a:pPr algn="ctr">
-              <a:defRPr sz="1600" b="0">
-                <a:solidFill>
-                  <a:srgbClr val="AAAABB"/>
-                </a:solidFill>
-                <a:latin typeface="Segoe UI"/>
-              </a:defRPr>
-            </a:pPr>
-            <a:r>
-              <a:t>▼</a:t>
+              <a:defRPr sz="1000" b="1">
+                <a:solidFill>
+                  <a:srgbClr val="00B4D8"/>
+                </a:solidFill>
+                <a:latin typeface="Segoe UI"/>
+              </a:defRPr>
+            </a:pPr>
+            <a:r>
+              <a:t>Route authentifiée</a:t>
             </a:r>
           </a:p>
         </p:txBody>
@@ -6356,8 +6372,8 @@
         </p:nvSpPr>
         <p:spPr>
           <a:xfrm>
-            <a:off x="1828800" y="3291839"/>
-            <a:ext cx="8229600" cy="868680"/>
+            <a:off x="1828800" y="3108960"/>
+            <a:ext cx="8229600" cy="1371600"/>
           </a:xfrm>
           <a:prstGeom prst="roundRect">
             <a:avLst/>
@@ -6365,7 +6381,7 @@
           <a:solidFill>
             <a:srgbClr val="2A1A4A"/>
           </a:solidFill>
-          <a:ln w="25400">
+          <a:ln w="38100">
             <a:solidFill>
               <a:srgbClr val="7C4DFF"/>
             </a:solidFill>
@@ -6402,8 +6418,8 @@
         </p:nvSpPr>
         <p:spPr>
           <a:xfrm>
-            <a:off x="2103120" y="3364991"/>
-            <a:ext cx="7315200" cy="365760"/>
+            <a:off x="2011680" y="3127248"/>
+            <a:ext cx="7772400" cy="320040"/>
           </a:xfrm>
           <a:prstGeom prst="rect">
             <a:avLst/>
@@ -6417,7 +6433,7 @@
           <a:lstStyle/>
           <a:p>
             <a:pPr algn="l">
-              <a:defRPr sz="1800" b="1">
+              <a:defRPr sz="1400" b="1">
                 <a:solidFill>
                   <a:srgbClr val="7C4DFF"/>
                 </a:solidFill>
@@ -6425,7 +6441,7 @@
               </a:defRPr>
             </a:pPr>
             <a:r>
-              <a:t>⚙️  Monolithe Modulaire</a:t>
+              <a:t>⚙️ Monolithe Modulaire — Spring Boot 3 / Java 21</a:t>
             </a:r>
           </a:p>
         </p:txBody>
@@ -6438,8 +6454,8 @@
         </p:nvSpPr>
         <p:spPr>
           <a:xfrm>
-            <a:off x="2103120" y="3730751"/>
-            <a:ext cx="7315200" cy="365760"/>
+            <a:off x="2011680" y="3474720"/>
+            <a:ext cx="2560320" cy="274320"/>
           </a:xfrm>
           <a:prstGeom prst="rect">
             <a:avLst/>
@@ -6453,7 +6469,7 @@
           <a:lstStyle/>
           <a:p>
             <a:pPr algn="l">
-              <a:defRPr sz="1200" b="0">
+              <a:defRPr sz="1000" b="0">
                 <a:solidFill>
                   <a:srgbClr val="CCCCCC"/>
                 </a:solidFill>
@@ -6461,7 +6477,7 @@
               </a:defRPr>
             </a:pPr>
             <a:r>
-              <a:t>Spring Boot 3 / Java 21 — 9 modules métier isolés</a:t>
+              <a:t>📦 Catalogue</a:t>
             </a:r>
           </a:p>
         </p:txBody>
@@ -6474,44 +6490,456 @@
         </p:nvSpPr>
         <p:spPr>
           <a:xfrm>
-            <a:off x="5486400" y="4114800"/>
-            <a:ext cx="914400" cy="274320"/>
-          </a:xfrm>
-          <a:prstGeom prst="rect">
-            <a:avLst/>
-          </a:prstGeom>
-          <a:noFill/>
-        </p:spPr>
-        <p:txBody>
-          <a:bodyPr wrap="square">
-            <a:spAutoFit/>
-          </a:bodyPr>
-          <a:lstStyle/>
-          <a:p>
-            <a:pPr algn="ctr">
-              <a:defRPr sz="1600" b="0">
-                <a:solidFill>
-                  <a:srgbClr val="AAAABB"/>
-                </a:solidFill>
-                <a:latin typeface="Segoe UI"/>
-              </a:defRPr>
-            </a:pPr>
-            <a:r>
-              <a:t>▼</a:t>
-            </a:r>
-          </a:p>
-        </p:txBody>
-      </p:sp>
-      <p:sp>
-        <p:nvSpPr>
-          <p:cNvPr id="16" name="Rounded Rectangle 15"/>
+            <a:off x="4709160" y="3474720"/>
+            <a:ext cx="2560320" cy="274320"/>
+          </a:xfrm>
+          <a:prstGeom prst="rect">
+            <a:avLst/>
+          </a:prstGeom>
+          <a:noFill/>
+        </p:spPr>
+        <p:txBody>
+          <a:bodyPr wrap="square">
+            <a:spAutoFit/>
+          </a:bodyPr>
+          <a:lstStyle/>
+          <a:p>
+            <a:pPr algn="l">
+              <a:defRPr sz="1000" b="0">
+                <a:solidFill>
+                  <a:srgbClr val="CCCCCC"/>
+                </a:solidFill>
+                <a:latin typeface="Segoe UI"/>
+              </a:defRPr>
+            </a:pPr>
+            <a:r>
+              <a:t>📅 Réservation</a:t>
+            </a:r>
+          </a:p>
+        </p:txBody>
+      </p:sp>
+      <p:sp>
+        <p:nvSpPr>
+          <p:cNvPr id="16" name="TextBox 15"/>
+          <p:cNvSpPr txBox="1"/>
+          <p:nvPr/>
+        </p:nvSpPr>
+        <p:spPr>
+          <a:xfrm>
+            <a:off x="7406640" y="3474720"/>
+            <a:ext cx="2560320" cy="274320"/>
+          </a:xfrm>
+          <a:prstGeom prst="rect">
+            <a:avLst/>
+          </a:prstGeom>
+          <a:noFill/>
+        </p:spPr>
+        <p:txBody>
+          <a:bodyPr wrap="square">
+            <a:spAutoFit/>
+          </a:bodyPr>
+          <a:lstStyle/>
+          <a:p>
+            <a:pPr algn="l">
+              <a:defRPr sz="1000" b="0">
+                <a:solidFill>
+                  <a:srgbClr val="CCCCCC"/>
+                </a:solidFill>
+                <a:latin typeface="Segoe UI"/>
+              </a:defRPr>
+            </a:pPr>
+            <a:r>
+              <a:t>📊 Stocks</a:t>
+            </a:r>
+          </a:p>
+        </p:txBody>
+      </p:sp>
+      <p:sp>
+        <p:nvSpPr>
+          <p:cNvPr id="17" name="TextBox 16"/>
+          <p:cNvSpPr txBox="1"/>
+          <p:nvPr/>
+        </p:nvSpPr>
+        <p:spPr>
+          <a:xfrm>
+            <a:off x="2011680" y="3794759"/>
+            <a:ext cx="2560320" cy="274320"/>
+          </a:xfrm>
+          <a:prstGeom prst="rect">
+            <a:avLst/>
+          </a:prstGeom>
+          <a:noFill/>
+        </p:spPr>
+        <p:txBody>
+          <a:bodyPr wrap="square">
+            <a:spAutoFit/>
+          </a:bodyPr>
+          <a:lstStyle/>
+          <a:p>
+            <a:pPr algn="l">
+              <a:defRPr sz="1000" b="0">
+                <a:solidFill>
+                  <a:srgbClr val="CCCCCC"/>
+                </a:solidFill>
+                <a:latin typeface="Segoe UI"/>
+              </a:defRPr>
+            </a:pPr>
+            <a:r>
+              <a:t>💳 Paiement</a:t>
+            </a:r>
+          </a:p>
+        </p:txBody>
+      </p:sp>
+      <p:sp>
+        <p:nvSpPr>
+          <p:cNvPr id="18" name="TextBox 17"/>
+          <p:cNvSpPr txBox="1"/>
+          <p:nvPr/>
+        </p:nvSpPr>
+        <p:spPr>
+          <a:xfrm>
+            <a:off x="4709160" y="3794759"/>
+            <a:ext cx="2560320" cy="274320"/>
+          </a:xfrm>
+          <a:prstGeom prst="rect">
+            <a:avLst/>
+          </a:prstGeom>
+          <a:noFill/>
+        </p:spPr>
+        <p:txBody>
+          <a:bodyPr wrap="square">
+            <a:spAutoFit/>
+          </a:bodyPr>
+          <a:lstStyle/>
+          <a:p>
+            <a:pPr algn="l">
+              <a:defRPr sz="1000" b="0">
+                <a:solidFill>
+                  <a:srgbClr val="CCCCCC"/>
+                </a:solidFill>
+                <a:latin typeface="Segoe UI"/>
+              </a:defRPr>
+            </a:pPr>
+            <a:r>
+              <a:t>👥 Utilisateurs</a:t>
+            </a:r>
+          </a:p>
+        </p:txBody>
+      </p:sp>
+      <p:sp>
+        <p:nvSpPr>
+          <p:cNvPr id="19" name="TextBox 18"/>
+          <p:cNvSpPr txBox="1"/>
+          <p:nvPr/>
+        </p:nvSpPr>
+        <p:spPr>
+          <a:xfrm>
+            <a:off x="7406640" y="3794759"/>
+            <a:ext cx="2560320" cy="274320"/>
+          </a:xfrm>
+          <a:prstGeom prst="rect">
+            <a:avLst/>
+          </a:prstGeom>
+          <a:noFill/>
+        </p:spPr>
+        <p:txBody>
+          <a:bodyPr wrap="square">
+            <a:spAutoFit/>
+          </a:bodyPr>
+          <a:lstStyle/>
+          <a:p>
+            <a:pPr algn="l">
+              <a:defRPr sz="1000" b="0">
+                <a:solidFill>
+                  <a:srgbClr val="CCCCCC"/>
+                </a:solidFill>
+                <a:latin typeface="Segoe UI"/>
+              </a:defRPr>
+            </a:pPr>
+            <a:r>
+              <a:t>🔔 Notifications</a:t>
+            </a:r>
+          </a:p>
+        </p:txBody>
+      </p:sp>
+      <p:sp>
+        <p:nvSpPr>
+          <p:cNvPr id="20" name="TextBox 19"/>
+          <p:cNvSpPr txBox="1"/>
+          <p:nvPr/>
+        </p:nvSpPr>
+        <p:spPr>
+          <a:xfrm>
+            <a:off x="2011680" y="4114800"/>
+            <a:ext cx="2560320" cy="274320"/>
+          </a:xfrm>
+          <a:prstGeom prst="rect">
+            <a:avLst/>
+          </a:prstGeom>
+          <a:noFill/>
+        </p:spPr>
+        <p:txBody>
+          <a:bodyPr wrap="square">
+            <a:spAutoFit/>
+          </a:bodyPr>
+          <a:lstStyle/>
+          <a:p>
+            <a:pPr algn="l">
+              <a:defRPr sz="1000" b="0">
+                <a:solidFill>
+                  <a:srgbClr val="CCCCCC"/>
+                </a:solidFill>
+                <a:latin typeface="Segoe UI"/>
+              </a:defRPr>
+            </a:pPr>
+            <a:r>
+              <a:t>🛠️ Admin</a:t>
+            </a:r>
+          </a:p>
+        </p:txBody>
+      </p:sp>
+      <p:sp>
+        <p:nvSpPr>
+          <p:cNvPr id="21" name="TextBox 20"/>
+          <p:cNvSpPr txBox="1"/>
+          <p:nvPr/>
+        </p:nvSpPr>
+        <p:spPr>
+          <a:xfrm>
+            <a:off x="4709160" y="4114800"/>
+            <a:ext cx="2560320" cy="274320"/>
+          </a:xfrm>
+          <a:prstGeom prst="rect">
+            <a:avLst/>
+          </a:prstGeom>
+          <a:noFill/>
+        </p:spPr>
+        <p:txBody>
+          <a:bodyPr wrap="square">
+            <a:spAutoFit/>
+          </a:bodyPr>
+          <a:lstStyle/>
+          <a:p>
+            <a:pPr algn="l">
+              <a:defRPr sz="1000" b="0">
+                <a:solidFill>
+                  <a:srgbClr val="CCCCCC"/>
+                </a:solidFill>
+                <a:latin typeface="Segoe UI"/>
+              </a:defRPr>
+            </a:pPr>
+            <a:r>
+              <a:t>🏷️ Marque Blanche</a:t>
+            </a:r>
+          </a:p>
+        </p:txBody>
+      </p:sp>
+      <p:sp>
+        <p:nvSpPr>
+          <p:cNvPr id="22" name="TextBox 21"/>
+          <p:cNvSpPr txBox="1"/>
+          <p:nvPr/>
+        </p:nvSpPr>
+        <p:spPr>
+          <a:xfrm>
+            <a:off x="7406640" y="4114800"/>
+            <a:ext cx="2560320" cy="274320"/>
+          </a:xfrm>
+          <a:prstGeom prst="rect">
+            <a:avLst/>
+          </a:prstGeom>
+          <a:noFill/>
+        </p:spPr>
+        <p:txBody>
+          <a:bodyPr wrap="square">
+            <a:spAutoFit/>
+          </a:bodyPr>
+          <a:lstStyle/>
+          <a:p>
+            <a:pPr algn="l">
+              <a:defRPr sz="1000" b="0">
+                <a:solidFill>
+                  <a:srgbClr val="CCCCCC"/>
+                </a:solidFill>
+                <a:latin typeface="Segoe UI"/>
+              </a:defRPr>
+            </a:pPr>
+            <a:r>
+              <a:t>🔗 Intégration</a:t>
+            </a:r>
+          </a:p>
+        </p:txBody>
+      </p:sp>
+      <p:sp>
+        <p:nvSpPr>
+          <p:cNvPr id="23" name="Down Arrow 22"/>
           <p:cNvSpPr/>
           <p:nvPr/>
         </p:nvSpPr>
         <p:spPr>
           <a:xfrm>
-            <a:off x="1828800" y="4343400"/>
-            <a:ext cx="8229600" cy="868680"/>
+            <a:off x="4572000" y="4498848"/>
+            <a:ext cx="365760" cy="320040"/>
+          </a:xfrm>
+          <a:prstGeom prst="downArrow">
+            <a:avLst/>
+          </a:prstGeom>
+          <a:solidFill>
+            <a:srgbClr val="FF6B35"/>
+          </a:solidFill>
+          <a:ln>
+            <a:noFill/>
+          </a:ln>
+          <a:effectLst/>
+        </p:spPr>
+        <p:style>
+          <a:lnRef idx="1">
+            <a:schemeClr val="accent1"/>
+          </a:lnRef>
+          <a:fillRef idx="3">
+            <a:schemeClr val="accent1"/>
+          </a:fillRef>
+          <a:effectRef idx="2">
+            <a:schemeClr val="accent1"/>
+          </a:effectRef>
+          <a:fontRef idx="minor">
+            <a:schemeClr val="lt1"/>
+          </a:fontRef>
+        </p:style>
+        <p:txBody>
+          <a:bodyPr rtlCol="0" anchor="ctr"/>
+          <a:lstStyle/>
+          <a:p>
+            <a:pPr algn="ctr"/>
+          </a:p>
+        </p:txBody>
+      </p:sp>
+      <p:sp>
+        <p:nvSpPr>
+          <p:cNvPr id="24" name="TextBox 23"/>
+          <p:cNvSpPr txBox="1"/>
+          <p:nvPr/>
+        </p:nvSpPr>
+        <p:spPr>
+          <a:xfrm>
+            <a:off x="5029200" y="4498848"/>
+            <a:ext cx="1371600" cy="274320"/>
+          </a:xfrm>
+          <a:prstGeom prst="rect">
+            <a:avLst/>
+          </a:prstGeom>
+          <a:noFill/>
+        </p:spPr>
+        <p:txBody>
+          <a:bodyPr wrap="square">
+            <a:spAutoFit/>
+          </a:bodyPr>
+          <a:lstStyle/>
+          <a:p>
+            <a:pPr algn="l">
+              <a:defRPr sz="1000" b="1">
+                <a:solidFill>
+                  <a:srgbClr val="FF6B35"/>
+                </a:solidFill>
+                <a:latin typeface="Segoe UI"/>
+              </a:defRPr>
+            </a:pPr>
+            <a:r>
+              <a:t>Publie</a:t>
+            </a:r>
+          </a:p>
+        </p:txBody>
+      </p:sp>
+      <p:sp>
+        <p:nvSpPr>
+          <p:cNvPr id="25" name="Up Arrow 24"/>
+          <p:cNvSpPr/>
+          <p:nvPr/>
+        </p:nvSpPr>
+        <p:spPr>
+          <a:xfrm>
+            <a:off x="6858000" y="4498848"/>
+            <a:ext cx="365760" cy="320040"/>
+          </a:xfrm>
+          <a:prstGeom prst="upArrow">
+            <a:avLst/>
+          </a:prstGeom>
+          <a:solidFill>
+            <a:srgbClr val="FF6B35"/>
+          </a:solidFill>
+          <a:ln>
+            <a:noFill/>
+          </a:ln>
+          <a:effectLst/>
+        </p:spPr>
+        <p:style>
+          <a:lnRef idx="1">
+            <a:schemeClr val="accent1"/>
+          </a:lnRef>
+          <a:fillRef idx="3">
+            <a:schemeClr val="accent1"/>
+          </a:fillRef>
+          <a:effectRef idx="2">
+            <a:schemeClr val="accent1"/>
+          </a:effectRef>
+          <a:fontRef idx="minor">
+            <a:schemeClr val="lt1"/>
+          </a:fontRef>
+        </p:style>
+        <p:txBody>
+          <a:bodyPr rtlCol="0" anchor="ctr"/>
+          <a:lstStyle/>
+          <a:p>
+            <a:pPr algn="ctr"/>
+          </a:p>
+        </p:txBody>
+      </p:sp>
+      <p:sp>
+        <p:nvSpPr>
+          <p:cNvPr id="26" name="TextBox 25"/>
+          <p:cNvSpPr txBox="1"/>
+          <p:nvPr/>
+        </p:nvSpPr>
+        <p:spPr>
+          <a:xfrm>
+            <a:off x="7269480" y="4498848"/>
+            <a:ext cx="1371600" cy="274320"/>
+          </a:xfrm>
+          <a:prstGeom prst="rect">
+            <a:avLst/>
+          </a:prstGeom>
+          <a:noFill/>
+        </p:spPr>
+        <p:txBody>
+          <a:bodyPr wrap="square">
+            <a:spAutoFit/>
+          </a:bodyPr>
+          <a:lstStyle/>
+          <a:p>
+            <a:pPr algn="l">
+              <a:defRPr sz="1000" b="1">
+                <a:solidFill>
+                  <a:srgbClr val="FF6B35"/>
+                </a:solidFill>
+                <a:latin typeface="Segoe UI"/>
+              </a:defRPr>
+            </a:pPr>
+            <a:r>
+              <a:t>Consomme</a:t>
+            </a:r>
+          </a:p>
+        </p:txBody>
+      </p:sp>
+      <p:sp>
+        <p:nvSpPr>
+          <p:cNvPr id="27" name="Rounded Rectangle 26"/>
+          <p:cNvSpPr/>
+          <p:nvPr/>
+        </p:nvSpPr>
+        <p:spPr>
+          <a:xfrm>
+            <a:off x="1828800" y="4846320"/>
+            <a:ext cx="8229600" cy="640080"/>
           </a:xfrm>
           <a:prstGeom prst="roundRect">
             <a:avLst/>
@@ -6550,14 +6978,14 @@
       </p:sp>
       <p:sp>
         <p:nvSpPr>
-          <p:cNvPr id="17" name="TextBox 16"/>
-          <p:cNvSpPr txBox="1"/>
-          <p:nvPr/>
-        </p:nvSpPr>
-        <p:spPr>
-          <a:xfrm>
-            <a:off x="2103120" y="4416552"/>
-            <a:ext cx="7315200" cy="365760"/>
+          <p:cNvPr id="28" name="TextBox 27"/>
+          <p:cNvSpPr txBox="1"/>
+          <p:nvPr/>
+        </p:nvSpPr>
+        <p:spPr>
+          <a:xfrm>
+            <a:off x="2011680" y="4873752"/>
+            <a:ext cx="7772400" cy="274320"/>
           </a:xfrm>
           <a:prstGeom prst="rect">
             <a:avLst/>
@@ -6571,7 +6999,7 @@
           <a:lstStyle/>
           <a:p>
             <a:pPr algn="l">
-              <a:defRPr sz="1800" b="1">
+              <a:defRPr sz="1400" b="1">
                 <a:solidFill>
                   <a:srgbClr val="FF6B35"/>
                 </a:solidFill>
@@ -6579,21 +7007,21 @@
               </a:defRPr>
             </a:pPr>
             <a:r>
-              <a:t>📨  Bus Événementiel</a:t>
-            </a:r>
-          </a:p>
-        </p:txBody>
-      </p:sp>
-      <p:sp>
-        <p:nvSpPr>
-          <p:cNvPr id="18" name="TextBox 17"/>
-          <p:cNvSpPr txBox="1"/>
-          <p:nvPr/>
-        </p:nvSpPr>
-        <p:spPr>
-          <a:xfrm>
-            <a:off x="2103120" y="4782312"/>
-            <a:ext cx="7315200" cy="365760"/>
+              <a:t>📨 Bus Événementiel — RabbitMQ</a:t>
+            </a:r>
+          </a:p>
+        </p:txBody>
+      </p:sp>
+      <p:sp>
+        <p:nvSpPr>
+          <p:cNvPr id="29" name="TextBox 28"/>
+          <p:cNvSpPr txBox="1"/>
+          <p:nvPr/>
+        </p:nvSpPr>
+        <p:spPr>
+          <a:xfrm>
+            <a:off x="2011680" y="5148072"/>
+            <a:ext cx="7772400" cy="274320"/>
           </a:xfrm>
           <a:prstGeom prst="rect">
             <a:avLst/>
@@ -6607,7 +7035,7 @@
           <a:lstStyle/>
           <a:p>
             <a:pPr algn="l">
-              <a:defRPr sz="1200" b="0">
+              <a:defRPr sz="1000" b="0">
                 <a:solidFill>
                   <a:srgbClr val="CCCCCC"/>
                 </a:solidFill>
@@ -6615,57 +7043,101 @@
               </a:defRPr>
             </a:pPr>
             <a:r>
-              <a:t>RabbitMQ — StockUpdated · ReservationCreated · PaymentValidated · PriceUpdated · StockLow</a:t>
-            </a:r>
-          </a:p>
-        </p:txBody>
-      </p:sp>
-      <p:sp>
-        <p:nvSpPr>
-          <p:cNvPr id="19" name="TextBox 18"/>
-          <p:cNvSpPr txBox="1"/>
-          <p:nvPr/>
-        </p:nvSpPr>
-        <p:spPr>
-          <a:xfrm>
-            <a:off x="5486400" y="5166360"/>
-            <a:ext cx="914400" cy="274320"/>
-          </a:xfrm>
-          <a:prstGeom prst="rect">
-            <a:avLst/>
-          </a:prstGeom>
-          <a:noFill/>
-        </p:spPr>
-        <p:txBody>
-          <a:bodyPr wrap="square">
-            <a:spAutoFit/>
-          </a:bodyPr>
-          <a:lstStyle/>
-          <a:p>
-            <a:pPr algn="ctr">
-              <a:defRPr sz="1600" b="0">
-                <a:solidFill>
-                  <a:srgbClr val="AAAABB"/>
-                </a:solidFill>
-                <a:latin typeface="Segoe UI"/>
-              </a:defRPr>
-            </a:pPr>
-            <a:r>
-              <a:t>▼</a:t>
-            </a:r>
-          </a:p>
-        </p:txBody>
-      </p:sp>
-      <p:sp>
-        <p:nvSpPr>
-          <p:cNvPr id="20" name="Rounded Rectangle 19"/>
+              <a:t>StockUpdated · ReservationCreated/Confirmed · PaymentValidated · PriceUpdated · StockLow</a:t>
+            </a:r>
+          </a:p>
+        </p:txBody>
+      </p:sp>
+      <p:sp>
+        <p:nvSpPr>
+          <p:cNvPr id="30" name="Down Arrow 29"/>
           <p:cNvSpPr/>
           <p:nvPr/>
         </p:nvSpPr>
         <p:spPr>
           <a:xfrm>
-            <a:off x="1828800" y="5394959"/>
-            <a:ext cx="8229600" cy="868680"/>
+            <a:off x="5852160" y="5504688"/>
+            <a:ext cx="365760" cy="320040"/>
+          </a:xfrm>
+          <a:prstGeom prst="downArrow">
+            <a:avLst/>
+          </a:prstGeom>
+          <a:solidFill>
+            <a:srgbClr val="00C9A7"/>
+          </a:solidFill>
+          <a:ln>
+            <a:noFill/>
+          </a:ln>
+          <a:effectLst/>
+        </p:spPr>
+        <p:style>
+          <a:lnRef idx="1">
+            <a:schemeClr val="accent1"/>
+          </a:lnRef>
+          <a:fillRef idx="3">
+            <a:schemeClr val="accent1"/>
+          </a:fillRef>
+          <a:effectRef idx="2">
+            <a:schemeClr val="accent1"/>
+          </a:effectRef>
+          <a:fontRef idx="minor">
+            <a:schemeClr val="lt1"/>
+          </a:fontRef>
+        </p:style>
+        <p:txBody>
+          <a:bodyPr rtlCol="0" anchor="ctr"/>
+          <a:lstStyle/>
+          <a:p>
+            <a:pPr algn="ctr"/>
+          </a:p>
+        </p:txBody>
+      </p:sp>
+      <p:sp>
+        <p:nvSpPr>
+          <p:cNvPr id="31" name="TextBox 30"/>
+          <p:cNvSpPr txBox="1"/>
+          <p:nvPr/>
+        </p:nvSpPr>
+        <p:spPr>
+          <a:xfrm>
+            <a:off x="6309360" y="5504688"/>
+            <a:ext cx="2286000" cy="274320"/>
+          </a:xfrm>
+          <a:prstGeom prst="rect">
+            <a:avLst/>
+          </a:prstGeom>
+          <a:noFill/>
+        </p:spPr>
+        <p:txBody>
+          <a:bodyPr wrap="square">
+            <a:spAutoFit/>
+          </a:bodyPr>
+          <a:lstStyle/>
+          <a:p>
+            <a:pPr algn="l">
+              <a:defRPr sz="1000" b="1">
+                <a:solidFill>
+                  <a:srgbClr val="00C9A7"/>
+                </a:solidFill>
+                <a:latin typeface="Segoe UI"/>
+              </a:defRPr>
+            </a:pPr>
+            <a:r>
+              <a:t>Persistance &amp; Cache</a:t>
+            </a:r>
+          </a:p>
+        </p:txBody>
+      </p:sp>
+      <p:sp>
+        <p:nvSpPr>
+          <p:cNvPr id="32" name="Rounded Rectangle 31"/>
+          <p:cNvSpPr/>
+          <p:nvPr/>
+        </p:nvSpPr>
+        <p:spPr>
+          <a:xfrm>
+            <a:off x="1828800" y="5852160"/>
+            <a:ext cx="8229600" cy="640080"/>
           </a:xfrm>
           <a:prstGeom prst="roundRect">
             <a:avLst/>
@@ -6704,14 +7176,14 @@
       </p:sp>
       <p:sp>
         <p:nvSpPr>
-          <p:cNvPr id="21" name="TextBox 20"/>
-          <p:cNvSpPr txBox="1"/>
-          <p:nvPr/>
-        </p:nvSpPr>
-        <p:spPr>
-          <a:xfrm>
-            <a:off x="2103120" y="5468111"/>
-            <a:ext cx="7315200" cy="365760"/>
+          <p:cNvPr id="33" name="TextBox 32"/>
+          <p:cNvSpPr txBox="1"/>
+          <p:nvPr/>
+        </p:nvSpPr>
+        <p:spPr>
+          <a:xfrm>
+            <a:off x="2011680" y="5879592"/>
+            <a:ext cx="7772400" cy="274320"/>
           </a:xfrm>
           <a:prstGeom prst="rect">
             <a:avLst/>
@@ -6725,7 +7197,7 @@
           <a:lstStyle/>
           <a:p>
             <a:pPr algn="l">
-              <a:defRPr sz="1800" b="1">
+              <a:defRPr sz="1400" b="1">
                 <a:solidFill>
                   <a:srgbClr val="00C9A7"/>
                 </a:solidFill>
@@ -6733,57 +7205,21 @@
               </a:defRPr>
             </a:pPr>
             <a:r>
-              <a:t>💾  Couche Données</a:t>
-            </a:r>
-          </a:p>
-        </p:txBody>
-      </p:sp>
-      <p:sp>
-        <p:nvSpPr>
-          <p:cNvPr id="22" name="TextBox 21"/>
-          <p:cNvSpPr txBox="1"/>
-          <p:nvPr/>
-        </p:nvSpPr>
-        <p:spPr>
-          <a:xfrm>
-            <a:off x="2103120" y="5833871"/>
-            <a:ext cx="7315200" cy="365760"/>
-          </a:xfrm>
-          <a:prstGeom prst="rect">
-            <a:avLst/>
-          </a:prstGeom>
-          <a:noFill/>
-        </p:spPr>
-        <p:txBody>
-          <a:bodyPr wrap="square">
-            <a:spAutoFit/>
-          </a:bodyPr>
-          <a:lstStyle/>
-          <a:p>
-            <a:pPr algn="l">
-              <a:defRPr sz="1200" b="0">
-                <a:solidFill>
-                  <a:srgbClr val="CCCCCC"/>
-                </a:solidFill>
-                <a:latin typeface="Segoe UI"/>
-              </a:defRPr>
-            </a:pPr>
-            <a:r>
-              <a:t>PostgreSQL 16 · Redis · Azure Blob Storage</a:t>
-            </a:r>
-          </a:p>
-        </p:txBody>
-      </p:sp>
-      <p:sp>
-        <p:nvSpPr>
-          <p:cNvPr id="23" name="Rounded Rectangle 22"/>
+              <a:t>💾 Couche Données — PostgreSQL 16 (schéma/module) · Redis (cache) · Azure Blob Storage</a:t>
+            </a:r>
+          </a:p>
+        </p:txBody>
+      </p:sp>
+      <p:sp>
+        <p:nvSpPr>
+          <p:cNvPr id="34" name="Rounded Rectangle 33"/>
           <p:cNvSpPr/>
           <p:nvPr/>
         </p:nvSpPr>
         <p:spPr>
           <a:xfrm>
-            <a:off x="274320" y="2286000"/>
-            <a:ext cx="1371600" cy="3200400"/>
+            <a:off x="182880" y="2743200"/>
+            <a:ext cx="1463040" cy="3840480"/>
           </a:xfrm>
           <a:prstGeom prst="roundRect">
             <a:avLst/>
@@ -6822,14 +7258,14 @@
       </p:sp>
       <p:sp>
         <p:nvSpPr>
-          <p:cNvPr id="24" name="TextBox 23"/>
-          <p:cNvSpPr txBox="1"/>
-          <p:nvPr/>
-        </p:nvSpPr>
-        <p:spPr>
-          <a:xfrm>
-            <a:off x="320040" y="2377440"/>
-            <a:ext cx="1280160" cy="457200"/>
+          <p:cNvPr id="35" name="TextBox 34"/>
+          <p:cNvSpPr txBox="1"/>
+          <p:nvPr/>
+        </p:nvSpPr>
+        <p:spPr>
+          <a:xfrm>
+            <a:off x="228600" y="2788920"/>
+            <a:ext cx="1371600" cy="320040"/>
           </a:xfrm>
           <a:prstGeom prst="rect">
             <a:avLst/>
@@ -6843,7 +7279,7 @@
           <a:lstStyle/>
           <a:p>
             <a:pPr algn="ctr">
-              <a:defRPr sz="1400" b="1">
+              <a:defRPr sz="1100" b="1">
                 <a:solidFill>
                   <a:srgbClr val="FF4557"/>
                 </a:solidFill>
@@ -6851,21 +7287,299 @@
               </a:defRPr>
             </a:pPr>
             <a:r>
-              <a:t>🌍 Tiers</a:t>
-            </a:r>
-          </a:p>
-        </p:txBody>
-      </p:sp>
-      <p:sp>
-        <p:nvSpPr>
-          <p:cNvPr id="25" name="TextBox 24"/>
-          <p:cNvSpPr txBox="1"/>
-          <p:nvPr/>
-        </p:nvSpPr>
-        <p:spPr>
-          <a:xfrm>
-            <a:off x="320040" y="2926080"/>
-            <a:ext cx="1280160" cy="2286000"/>
+              <a:t>🌍 Systèmes Tiers</a:t>
+            </a:r>
+          </a:p>
+        </p:txBody>
+      </p:sp>
+      <p:sp>
+        <p:nvSpPr>
+          <p:cNvPr id="36" name="TextBox 35"/>
+          <p:cNvSpPr txBox="1"/>
+          <p:nvPr/>
+        </p:nvSpPr>
+        <p:spPr>
+          <a:xfrm>
+            <a:off x="228600" y="3108960"/>
+            <a:ext cx="1371600" cy="3200400"/>
+          </a:xfrm>
+          <a:prstGeom prst="rect">
+            <a:avLst/>
+          </a:prstGeom>
+          <a:noFill/>
+        </p:spPr>
+        <p:txBody>
+          <a:bodyPr wrap="square">
+            <a:spAutoFit/>
+          </a:bodyPr>
+          <a:lstStyle/>
+          <a:p>
+            <a:pPr>
+              <a:spcAft>
+                <a:spcPts val="600"/>
+              </a:spcAft>
+              <a:defRPr sz="900">
+                <a:solidFill>
+                  <a:srgbClr val="CCCCCC"/>
+                </a:solidFill>
+                <a:latin typeface="Segoe UI"/>
+              </a:defRPr>
+            </a:pPr>
+            <a:r>
+              <a:t>📋 SAP B1</a:t>
+            </a:r>
+          </a:p>
+          <a:p>
+            <a:pPr>
+              <a:spcAft>
+                <a:spcPts val="600"/>
+              </a:spcAft>
+              <a:defRPr sz="900">
+                <a:solidFill>
+                  <a:srgbClr val="CCCCCC"/>
+                </a:solidFill>
+                <a:latin typeface="Segoe UI"/>
+              </a:defRPr>
+            </a:pPr>
+            <a:r>
+              <a:t>   (Stocks/Compta)</a:t>
+            </a:r>
+          </a:p>
+          <a:p>
+            <a:pPr>
+              <a:spcAft>
+                <a:spcPts val="600"/>
+              </a:spcAft>
+              <a:defRPr sz="900">
+                <a:solidFill>
+                  <a:srgbClr val="CCCCCC"/>
+                </a:solidFill>
+                <a:latin typeface="Segoe UI"/>
+              </a:defRPr>
+            </a:pPr>
+          </a:p>
+          <a:p>
+            <a:pPr>
+              <a:spcAft>
+                <a:spcPts val="600"/>
+              </a:spcAft>
+              <a:defRPr sz="900">
+                <a:solidFill>
+                  <a:srgbClr val="CCCCCC"/>
+                </a:solidFill>
+                <a:latin typeface="Segoe UI"/>
+              </a:defRPr>
+            </a:pPr>
+            <a:r>
+              <a:t>💳 Stripe</a:t>
+            </a:r>
+          </a:p>
+          <a:p>
+            <a:pPr>
+              <a:spcAft>
+                <a:spcPts val="600"/>
+              </a:spcAft>
+              <a:defRPr sz="900">
+                <a:solidFill>
+                  <a:srgbClr val="CCCCCC"/>
+                </a:solidFill>
+                <a:latin typeface="Segoe UI"/>
+              </a:defRPr>
+            </a:pPr>
+            <a:r>
+              <a:t>   (Paiement)</a:t>
+            </a:r>
+          </a:p>
+          <a:p>
+            <a:pPr>
+              <a:spcAft>
+                <a:spcPts val="600"/>
+              </a:spcAft>
+              <a:defRPr sz="900">
+                <a:solidFill>
+                  <a:srgbClr val="CCCCCC"/>
+                </a:solidFill>
+                <a:latin typeface="Segoe UI"/>
+              </a:defRPr>
+            </a:pPr>
+          </a:p>
+          <a:p>
+            <a:pPr>
+              <a:spcAft>
+                <a:spcPts val="600"/>
+              </a:spcAft>
+              <a:defRPr sz="900">
+                <a:solidFill>
+                  <a:srgbClr val="CCCCCC"/>
+                </a:solidFill>
+                <a:latin typeface="Segoe UI"/>
+              </a:defRPr>
+            </a:pPr>
+            <a:r>
+              <a:t>📊 Comp. Prix</a:t>
+            </a:r>
+          </a:p>
+          <a:p>
+            <a:pPr>
+              <a:spcAft>
+                <a:spcPts val="600"/>
+              </a:spcAft>
+              <a:defRPr sz="900">
+                <a:solidFill>
+                  <a:srgbClr val="CCCCCC"/>
+                </a:solidFill>
+                <a:latin typeface="Segoe UI"/>
+              </a:defRPr>
+            </a:pPr>
+            <a:r>
+              <a:t>   (SaaS)</a:t>
+            </a:r>
+          </a:p>
+          <a:p>
+            <a:pPr>
+              <a:spcAft>
+                <a:spcPts val="600"/>
+              </a:spcAft>
+              <a:defRPr sz="900">
+                <a:solidFill>
+                  <a:srgbClr val="CCCCCC"/>
+                </a:solidFill>
+                <a:latin typeface="Segoe UI"/>
+              </a:defRPr>
+            </a:pPr>
+          </a:p>
+          <a:p>
+            <a:pPr>
+              <a:spcAft>
+                <a:spcPts val="600"/>
+              </a:spcAft>
+              <a:defRPr sz="900">
+                <a:solidFill>
+                  <a:srgbClr val="CCCCCC"/>
+                </a:solidFill>
+                <a:latin typeface="Segoe UI"/>
+              </a:defRPr>
+            </a:pPr>
+            <a:r>
+              <a:t>📈 Power BI</a:t>
+            </a:r>
+          </a:p>
+          <a:p>
+            <a:pPr>
+              <a:spcAft>
+                <a:spcPts val="600"/>
+              </a:spcAft>
+              <a:defRPr sz="900">
+                <a:solidFill>
+                  <a:srgbClr val="CCCCCC"/>
+                </a:solidFill>
+                <a:latin typeface="Segoe UI"/>
+              </a:defRPr>
+            </a:pPr>
+            <a:r>
+              <a:t>   (Analytics)</a:t>
+            </a:r>
+          </a:p>
+        </p:txBody>
+      </p:sp>
+      <p:sp>
+        <p:nvSpPr>
+          <p:cNvPr id="37" name="Right Arrow 36"/>
+          <p:cNvSpPr/>
+          <p:nvPr/>
+        </p:nvSpPr>
+        <p:spPr>
+          <a:xfrm>
+            <a:off x="1664208" y="3474720"/>
+            <a:ext cx="457200" cy="228600"/>
+          </a:xfrm>
+          <a:prstGeom prst="rightArrow">
+            <a:avLst/>
+          </a:prstGeom>
+          <a:solidFill>
+            <a:srgbClr val="FF4557"/>
+          </a:solidFill>
+          <a:ln>
+            <a:noFill/>
+          </a:ln>
+          <a:effectLst/>
+        </p:spPr>
+        <p:style>
+          <a:lnRef idx="1">
+            <a:schemeClr val="accent1"/>
+          </a:lnRef>
+          <a:fillRef idx="3">
+            <a:schemeClr val="accent1"/>
+          </a:fillRef>
+          <a:effectRef idx="2">
+            <a:schemeClr val="accent1"/>
+          </a:effectRef>
+          <a:fontRef idx="minor">
+            <a:schemeClr val="lt1"/>
+          </a:fontRef>
+        </p:style>
+        <p:txBody>
+          <a:bodyPr rtlCol="0" anchor="ctr"/>
+          <a:lstStyle/>
+          <a:p>
+            <a:pPr algn="ctr"/>
+          </a:p>
+        </p:txBody>
+      </p:sp>
+      <p:sp>
+        <p:nvSpPr>
+          <p:cNvPr id="38" name="Left Arrow 37"/>
+          <p:cNvSpPr/>
+          <p:nvPr/>
+        </p:nvSpPr>
+        <p:spPr>
+          <a:xfrm>
+            <a:off x="1664208" y="3931920"/>
+            <a:ext cx="457200" cy="228600"/>
+          </a:xfrm>
+          <a:prstGeom prst="leftArrow">
+            <a:avLst/>
+          </a:prstGeom>
+          <a:solidFill>
+            <a:srgbClr val="FF4557"/>
+          </a:solidFill>
+          <a:ln>
+            <a:noFill/>
+          </a:ln>
+          <a:effectLst/>
+        </p:spPr>
+        <p:style>
+          <a:lnRef idx="1">
+            <a:schemeClr val="accent1"/>
+          </a:lnRef>
+          <a:fillRef idx="3">
+            <a:schemeClr val="accent1"/>
+          </a:fillRef>
+          <a:effectRef idx="2">
+            <a:schemeClr val="accent1"/>
+          </a:effectRef>
+          <a:fontRef idx="minor">
+            <a:schemeClr val="lt1"/>
+          </a:fontRef>
+        </p:style>
+        <p:txBody>
+          <a:bodyPr rtlCol="0" anchor="ctr"/>
+          <a:lstStyle/>
+          <a:p>
+            <a:pPr algn="ctr"/>
+          </a:p>
+        </p:txBody>
+      </p:sp>
+      <p:sp>
+        <p:nvSpPr>
+          <p:cNvPr id="39" name="TextBox 38"/>
+          <p:cNvSpPr txBox="1"/>
+          <p:nvPr/>
+        </p:nvSpPr>
+        <p:spPr>
+          <a:xfrm>
+            <a:off x="914400" y="4187952"/>
+            <a:ext cx="914400" cy="228600"/>
           </a:xfrm>
           <a:prstGeom prst="rect">
             <a:avLst/>
@@ -6879,31 +7593,19 @@
           <a:lstStyle/>
           <a:p>
             <a:pPr algn="ctr">
-              <a:defRPr sz="1100" b="0">
-                <a:solidFill>
-                  <a:srgbClr val="CCCCCC"/>
-                </a:solidFill>
-                <a:latin typeface="Segoe UI"/>
-              </a:defRPr>
-            </a:pPr>
-            <a:r>
-              <a:t>SAP</a:t>
+              <a:defRPr sz="800" b="0">
+                <a:solidFill>
+                  <a:srgbClr val="FF4557"/>
+                </a:solidFill>
+                <a:latin typeface="Segoe UI"/>
+              </a:defRPr>
+            </a:pPr>
+            <a:r>
+              <a:t>REST &amp;</a:t>
             </a:r>
             <a:br/>
             <a:r>
-              <a:t>Stripe</a:t>
-            </a:r>
-            <a:br/>
-            <a:r>
-              <a:t>Comp. Prix</a:t>
-            </a:r>
-            <a:br/>
-            <a:r>
-              <a:t>Power BI</a:t>
-            </a:r>
-            <a:br/>
-            <a:r>
-              <a:t>SMTP</a:t>
+              <a:t>Webhooks</a:t>
             </a:r>
           </a:p>
         </p:txBody>
@@ -6965,7 +7667,7 @@
               </a:defRPr>
             </a:pPr>
             <a:r>
-              <a:t>10b. Les 9 modules applicatifs</a:t>
+              <a:t>10b. Modules &amp; interactions événementielles</a:t>
             </a:r>
           </a:p>
         </p:txBody>
@@ -7022,8 +7724,8 @@
         </p:nvSpPr>
         <p:spPr>
           <a:xfrm>
-            <a:off x="548640" y="1188720"/>
-            <a:ext cx="3474720" cy="1554480"/>
+            <a:off x="365760" y="1097280"/>
+            <a:ext cx="3474720" cy="1234440"/>
           </a:xfrm>
           <a:prstGeom prst="roundRect">
             <a:avLst/>
@@ -7068,8 +7770,8 @@
         </p:nvSpPr>
         <p:spPr>
           <a:xfrm>
-            <a:off x="685800" y="1280160"/>
-            <a:ext cx="3200400" cy="411480"/>
+            <a:off x="457200" y="1143000"/>
+            <a:ext cx="3291840" cy="320040"/>
           </a:xfrm>
           <a:prstGeom prst="rect">
             <a:avLst/>
@@ -7083,7 +7785,7 @@
           <a:lstStyle/>
           <a:p>
             <a:pPr algn="l">
-              <a:defRPr sz="1600" b="1">
+              <a:defRPr sz="1400" b="1">
                 <a:solidFill>
                   <a:srgbClr val="0096D6"/>
                 </a:solidFill>
@@ -7104,8 +7806,8 @@
         </p:nvSpPr>
         <p:spPr>
           <a:xfrm>
-            <a:off x="685800" y="1691640"/>
-            <a:ext cx="3200400" cy="914400"/>
+            <a:off x="457200" y="1463040"/>
+            <a:ext cx="3291840" cy="822960"/>
           </a:xfrm>
           <a:prstGeom prst="rect">
             <a:avLst/>
@@ -7119,7 +7821,7 @@
           <a:lstStyle/>
           <a:p>
             <a:pPr algn="l">
-              <a:defRPr sz="1200" b="0">
+              <a:defRPr sz="1100" b="0">
                 <a:solidFill>
                   <a:srgbClr val="CCCCCC"/>
                 </a:solidFill>
@@ -7148,8 +7850,8 @@
         </p:nvSpPr>
         <p:spPr>
           <a:xfrm>
-            <a:off x="4389120" y="1188720"/>
-            <a:ext cx="3474720" cy="1554480"/>
+            <a:off x="4206240" y="1097280"/>
+            <a:ext cx="3474720" cy="1234440"/>
           </a:xfrm>
           <a:prstGeom prst="roundRect">
             <a:avLst/>
@@ -7194,8 +7896,8 @@
         </p:nvSpPr>
         <p:spPr>
           <a:xfrm>
-            <a:off x="4526280" y="1280160"/>
-            <a:ext cx="3200400" cy="411480"/>
+            <a:off x="4297680" y="1143000"/>
+            <a:ext cx="3291840" cy="320040"/>
           </a:xfrm>
           <a:prstGeom prst="rect">
             <a:avLst/>
@@ -7209,7 +7911,7 @@
           <a:lstStyle/>
           <a:p>
             <a:pPr algn="l">
-              <a:defRPr sz="1600" b="1">
+              <a:defRPr sz="1400" b="1">
                 <a:solidFill>
                   <a:srgbClr val="00B4D8"/>
                 </a:solidFill>
@@ -7230,8 +7932,8 @@
         </p:nvSpPr>
         <p:spPr>
           <a:xfrm>
-            <a:off x="4526280" y="1691640"/>
-            <a:ext cx="3200400" cy="914400"/>
+            <a:off x="4297680" y="1463040"/>
+            <a:ext cx="3291840" cy="822960"/>
           </a:xfrm>
           <a:prstGeom prst="rect">
             <a:avLst/>
@@ -7245,7 +7947,7 @@
           <a:lstStyle/>
           <a:p>
             <a:pPr algn="l">
-              <a:defRPr sz="1200" b="0">
+              <a:defRPr sz="1100" b="0">
                 <a:solidFill>
                   <a:srgbClr val="CCCCCC"/>
                 </a:solidFill>
@@ -7274,8 +7976,8 @@
         </p:nvSpPr>
         <p:spPr>
           <a:xfrm>
-            <a:off x="8229600" y="1188720"/>
-            <a:ext cx="3474720" cy="1554480"/>
+            <a:off x="8046720" y="1097280"/>
+            <a:ext cx="3474720" cy="1234440"/>
           </a:xfrm>
           <a:prstGeom prst="roundRect">
             <a:avLst/>
@@ -7320,8 +8022,8 @@
         </p:nvSpPr>
         <p:spPr>
           <a:xfrm>
-            <a:off x="8366760" y="1280160"/>
-            <a:ext cx="3200400" cy="411480"/>
+            <a:off x="8138160" y="1143000"/>
+            <a:ext cx="3291840" cy="320040"/>
           </a:xfrm>
           <a:prstGeom prst="rect">
             <a:avLst/>
@@ -7335,7 +8037,7 @@
           <a:lstStyle/>
           <a:p>
             <a:pPr algn="l">
-              <a:defRPr sz="1600" b="1">
+              <a:defRPr sz="1400" b="1">
                 <a:solidFill>
                   <a:srgbClr val="FF6B35"/>
                 </a:solidFill>
@@ -7356,8 +8058,8 @@
         </p:nvSpPr>
         <p:spPr>
           <a:xfrm>
-            <a:off x="8366760" y="1691640"/>
-            <a:ext cx="3200400" cy="914400"/>
+            <a:off x="8138160" y="1463040"/>
+            <a:ext cx="3291840" cy="822960"/>
           </a:xfrm>
           <a:prstGeom prst="rect">
             <a:avLst/>
@@ -7371,7 +8073,7 @@
           <a:lstStyle/>
           <a:p>
             <a:pPr algn="l">
-              <a:defRPr sz="1200" b="0">
+              <a:defRPr sz="1100" b="0">
                 <a:solidFill>
                   <a:srgbClr val="CCCCCC"/>
                 </a:solidFill>
@@ -7400,8 +8102,8 @@
         </p:nvSpPr>
         <p:spPr>
           <a:xfrm>
-            <a:off x="548640" y="3017520"/>
-            <a:ext cx="3474720" cy="1554480"/>
+            <a:off x="365760" y="2606039"/>
+            <a:ext cx="3474720" cy="1234440"/>
           </a:xfrm>
           <a:prstGeom prst="roundRect">
             <a:avLst/>
@@ -7446,8 +8148,8 @@
         </p:nvSpPr>
         <p:spPr>
           <a:xfrm>
-            <a:off x="685800" y="3108960"/>
-            <a:ext cx="3200400" cy="411480"/>
+            <a:off x="457200" y="2651759"/>
+            <a:ext cx="3291840" cy="320040"/>
           </a:xfrm>
           <a:prstGeom prst="rect">
             <a:avLst/>
@@ -7461,7 +8163,7 @@
           <a:lstStyle/>
           <a:p>
             <a:pPr algn="l">
-              <a:defRPr sz="1600" b="1">
+              <a:defRPr sz="1400" b="1">
                 <a:solidFill>
                   <a:srgbClr val="FF4557"/>
                 </a:solidFill>
@@ -7482,8 +8184,8 @@
         </p:nvSpPr>
         <p:spPr>
           <a:xfrm>
-            <a:off x="685800" y="3520440"/>
-            <a:ext cx="3200400" cy="914400"/>
+            <a:off x="457200" y="2971799"/>
+            <a:ext cx="3291840" cy="822960"/>
           </a:xfrm>
           <a:prstGeom prst="rect">
             <a:avLst/>
@@ -7497,7 +8199,7 @@
           <a:lstStyle/>
           <a:p>
             <a:pPr algn="l">
-              <a:defRPr sz="1200" b="0">
+              <a:defRPr sz="1100" b="0">
                 <a:solidFill>
                   <a:srgbClr val="CCCCCC"/>
                 </a:solidFill>
@@ -7526,8 +8228,8 @@
         </p:nvSpPr>
         <p:spPr>
           <a:xfrm>
-            <a:off x="4389120" y="3017520"/>
-            <a:ext cx="3474720" cy="1554480"/>
+            <a:off x="4206240" y="2606039"/>
+            <a:ext cx="3474720" cy="1234440"/>
           </a:xfrm>
           <a:prstGeom prst="roundRect">
             <a:avLst/>
@@ -7572,8 +8274,8 @@
         </p:nvSpPr>
         <p:spPr>
           <a:xfrm>
-            <a:off x="4526280" y="3108960"/>
-            <a:ext cx="3200400" cy="411480"/>
+            <a:off x="4297680" y="2651759"/>
+            <a:ext cx="3291840" cy="320040"/>
           </a:xfrm>
           <a:prstGeom prst="rect">
             <a:avLst/>
@@ -7587,7 +8289,7 @@
           <a:lstStyle/>
           <a:p>
             <a:pPr algn="l">
-              <a:defRPr sz="1600" b="1">
+              <a:defRPr sz="1400" b="1">
                 <a:solidFill>
                   <a:srgbClr val="7C4DFF"/>
                 </a:solidFill>
@@ -7608,8 +8310,8 @@
         </p:nvSpPr>
         <p:spPr>
           <a:xfrm>
-            <a:off x="4526280" y="3520440"/>
-            <a:ext cx="3200400" cy="914400"/>
+            <a:off x="4297680" y="2971799"/>
+            <a:ext cx="3291840" cy="822960"/>
           </a:xfrm>
           <a:prstGeom prst="rect">
             <a:avLst/>
@@ -7623,7 +8325,7 @@
           <a:lstStyle/>
           <a:p>
             <a:pPr algn="l">
-              <a:defRPr sz="1200" b="0">
+              <a:defRPr sz="1100" b="0">
                 <a:solidFill>
                   <a:srgbClr val="CCCCCC"/>
                 </a:solidFill>
@@ -7652,8 +8354,8 @@
         </p:nvSpPr>
         <p:spPr>
           <a:xfrm>
-            <a:off x="8229600" y="3017520"/>
-            <a:ext cx="3474720" cy="1554480"/>
+            <a:off x="8046720" y="2606039"/>
+            <a:ext cx="3474720" cy="1234440"/>
           </a:xfrm>
           <a:prstGeom prst="roundRect">
             <a:avLst/>
@@ -7698,8 +8400,8 @@
         </p:nvSpPr>
         <p:spPr>
           <a:xfrm>
-            <a:off x="8366760" y="3108960"/>
-            <a:ext cx="3200400" cy="411480"/>
+            <a:off x="8138160" y="2651759"/>
+            <a:ext cx="3291840" cy="320040"/>
           </a:xfrm>
           <a:prstGeom prst="rect">
             <a:avLst/>
@@ -7713,7 +8415,7 @@
           <a:lstStyle/>
           <a:p>
             <a:pPr algn="l">
-              <a:defRPr sz="1600" b="1">
+              <a:defRPr sz="1400" b="1">
                 <a:solidFill>
                   <a:srgbClr val="FFD93D"/>
                 </a:solidFill>
@@ -7734,8 +8436,8 @@
         </p:nvSpPr>
         <p:spPr>
           <a:xfrm>
-            <a:off x="8366760" y="3520440"/>
-            <a:ext cx="3200400" cy="914400"/>
+            <a:off x="8138160" y="2971799"/>
+            <a:ext cx="3291840" cy="822960"/>
           </a:xfrm>
           <a:prstGeom prst="rect">
             <a:avLst/>
@@ -7749,7 +8451,7 @@
           <a:lstStyle/>
           <a:p>
             <a:pPr algn="l">
-              <a:defRPr sz="1200" b="0">
+              <a:defRPr sz="1100" b="0">
                 <a:solidFill>
                   <a:srgbClr val="CCCCCC"/>
                 </a:solidFill>
@@ -7778,8 +8480,8 @@
         </p:nvSpPr>
         <p:spPr>
           <a:xfrm>
-            <a:off x="548640" y="4846320"/>
-            <a:ext cx="3474720" cy="1554480"/>
+            <a:off x="365760" y="4114800"/>
+            <a:ext cx="3474720" cy="1234440"/>
           </a:xfrm>
           <a:prstGeom prst="roundRect">
             <a:avLst/>
@@ -7824,8 +8526,8 @@
         </p:nvSpPr>
         <p:spPr>
           <a:xfrm>
-            <a:off x="685800" y="4937760"/>
-            <a:ext cx="3200400" cy="411480"/>
+            <a:off x="457200" y="4160520"/>
+            <a:ext cx="3291840" cy="320040"/>
           </a:xfrm>
           <a:prstGeom prst="rect">
             <a:avLst/>
@@ -7839,7 +8541,7 @@
           <a:lstStyle/>
           <a:p>
             <a:pPr algn="l">
-              <a:defRPr sz="1600" b="1">
+              <a:defRPr sz="1400" b="1">
                 <a:solidFill>
                   <a:srgbClr val="00C9A7"/>
                 </a:solidFill>
@@ -7860,8 +8562,8 @@
         </p:nvSpPr>
         <p:spPr>
           <a:xfrm>
-            <a:off x="685800" y="5349240"/>
-            <a:ext cx="3200400" cy="914400"/>
+            <a:off x="457200" y="4480560"/>
+            <a:ext cx="3291840" cy="822960"/>
           </a:xfrm>
           <a:prstGeom prst="rect">
             <a:avLst/>
@@ -7875,7 +8577,7 @@
           <a:lstStyle/>
           <a:p>
             <a:pPr algn="l">
-              <a:defRPr sz="1200" b="0">
+              <a:defRPr sz="1100" b="0">
                 <a:solidFill>
                   <a:srgbClr val="CCCCCC"/>
                 </a:solidFill>
@@ -7904,8 +8606,8 @@
         </p:nvSpPr>
         <p:spPr>
           <a:xfrm>
-            <a:off x="4389120" y="4846320"/>
-            <a:ext cx="3474720" cy="1554480"/>
+            <a:off x="4206240" y="4114800"/>
+            <a:ext cx="3474720" cy="1234440"/>
           </a:xfrm>
           <a:prstGeom prst="roundRect">
             <a:avLst/>
@@ -7950,8 +8652,8 @@
         </p:nvSpPr>
         <p:spPr>
           <a:xfrm>
-            <a:off x="4526280" y="4937760"/>
-            <a:ext cx="3200400" cy="411480"/>
+            <a:off x="4297680" y="4160520"/>
+            <a:ext cx="3291840" cy="320040"/>
           </a:xfrm>
           <a:prstGeom prst="rect">
             <a:avLst/>
@@ -7965,7 +8667,7 @@
           <a:lstStyle/>
           <a:p>
             <a:pPr algn="l">
-              <a:defRPr sz="1600" b="1">
+              <a:defRPr sz="1400" b="1">
                 <a:solidFill>
                   <a:srgbClr val="FF80AB"/>
                 </a:solidFill>
@@ -7986,8 +8688,8 @@
         </p:nvSpPr>
         <p:spPr>
           <a:xfrm>
-            <a:off x="4526280" y="5349240"/>
-            <a:ext cx="3200400" cy="914400"/>
+            <a:off x="4297680" y="4480560"/>
+            <a:ext cx="3291840" cy="822960"/>
           </a:xfrm>
           <a:prstGeom prst="rect">
             <a:avLst/>
@@ -8001,7 +8703,7 @@
           <a:lstStyle/>
           <a:p>
             <a:pPr algn="l">
-              <a:defRPr sz="1200" b="0">
+              <a:defRPr sz="1100" b="0">
                 <a:solidFill>
                   <a:srgbClr val="CCCCCC"/>
                 </a:solidFill>
@@ -8030,8 +8732,8 @@
         </p:nvSpPr>
         <p:spPr>
           <a:xfrm>
-            <a:off x="8229600" y="4846320"/>
-            <a:ext cx="3474720" cy="1554480"/>
+            <a:off x="8046720" y="4114800"/>
+            <a:ext cx="3474720" cy="1234440"/>
           </a:xfrm>
           <a:prstGeom prst="roundRect">
             <a:avLst/>
@@ -8076,8 +8778,8 @@
         </p:nvSpPr>
         <p:spPr>
           <a:xfrm>
-            <a:off x="8366760" y="4937760"/>
-            <a:ext cx="3200400" cy="411480"/>
+            <a:off x="8138160" y="4160520"/>
+            <a:ext cx="3291840" cy="320040"/>
           </a:xfrm>
           <a:prstGeom prst="rect">
             <a:avLst/>
@@ -8091,7 +8793,7 @@
           <a:lstStyle/>
           <a:p>
             <a:pPr algn="l">
-              <a:defRPr sz="1600" b="1">
+              <a:defRPr sz="1400" b="1">
                 <a:solidFill>
                   <a:srgbClr val="82B1FF"/>
                 </a:solidFill>
@@ -8112,8 +8814,8 @@
         </p:nvSpPr>
         <p:spPr>
           <a:xfrm>
-            <a:off x="8366760" y="5349240"/>
-            <a:ext cx="3200400" cy="914400"/>
+            <a:off x="8138160" y="4480560"/>
+            <a:ext cx="3291840" cy="822960"/>
           </a:xfrm>
           <a:prstGeom prst="rect">
             <a:avLst/>
@@ -8127,7 +8829,7 @@
           <a:lstStyle/>
           <a:p>
             <a:pPr algn="l">
-              <a:defRPr sz="1200" b="0">
+              <a:defRPr sz="1100" b="0">
                 <a:solidFill>
                   <a:srgbClr val="CCCCCC"/>
                 </a:solidFill>
@@ -8144,6 +8846,253 @@
             <a:br/>
             <a:r>
               <a:t>Spring Batch</a:t>
+            </a:r>
+          </a:p>
+        </p:txBody>
+      </p:sp>
+      <p:sp>
+        <p:nvSpPr>
+          <p:cNvPr id="31" name="Rounded Rectangle 30"/>
+          <p:cNvSpPr/>
+          <p:nvPr/>
+        </p:nvSpPr>
+        <p:spPr>
+          <a:xfrm>
+            <a:off x="365760" y="5623560"/>
+            <a:ext cx="11430000" cy="1051560"/>
+          </a:xfrm>
+          <a:prstGeom prst="roundRect">
+            <a:avLst/>
+          </a:prstGeom>
+          <a:solidFill>
+            <a:srgbClr val="252035"/>
+          </a:solidFill>
+          <a:ln w="25400">
+            <a:solidFill>
+              <a:srgbClr val="7C4DFF"/>
+            </a:solidFill>
+          </a:ln>
+          <a:effectLst/>
+        </p:spPr>
+        <p:style>
+          <a:lnRef idx="1">
+            <a:schemeClr val="accent1"/>
+          </a:lnRef>
+          <a:fillRef idx="3">
+            <a:schemeClr val="accent1"/>
+          </a:fillRef>
+          <a:effectRef idx="2">
+            <a:schemeClr val="accent1"/>
+          </a:effectRef>
+          <a:fontRef idx="minor">
+            <a:schemeClr val="lt1"/>
+          </a:fontRef>
+        </p:style>
+        <p:txBody>
+          <a:bodyPr rtlCol="0" anchor="ctr"/>
+          <a:lstStyle/>
+          <a:p>
+            <a:pPr algn="ctr"/>
+          </a:p>
+        </p:txBody>
+      </p:sp>
+      <p:sp>
+        <p:nvSpPr>
+          <p:cNvPr id="32" name="TextBox 31"/>
+          <p:cNvSpPr txBox="1"/>
+          <p:nvPr/>
+        </p:nvSpPr>
+        <p:spPr>
+          <a:xfrm>
+            <a:off x="548640" y="5650992"/>
+            <a:ext cx="10972800" cy="320040"/>
+          </a:xfrm>
+          <a:prstGeom prst="rect">
+            <a:avLst/>
+          </a:prstGeom>
+          <a:noFill/>
+        </p:spPr>
+        <p:txBody>
+          <a:bodyPr wrap="square">
+            <a:spAutoFit/>
+          </a:bodyPr>
+          <a:lstStyle/>
+          <a:p>
+            <a:pPr algn="l">
+              <a:defRPr sz="1400" b="1">
+                <a:solidFill>
+                  <a:srgbClr val="7C4DFF"/>
+                </a:solidFill>
+                <a:latin typeface="Segoe UI"/>
+              </a:defRPr>
+            </a:pPr>
+            <a:r>
+              <a:t>🔀 Flux événementiels (RabbitMQ)</a:t>
+            </a:r>
+          </a:p>
+        </p:txBody>
+      </p:sp>
+      <p:sp>
+        <p:nvSpPr>
+          <p:cNvPr id="33" name="TextBox 32"/>
+          <p:cNvSpPr txBox="1"/>
+          <p:nvPr/>
+        </p:nvSpPr>
+        <p:spPr>
+          <a:xfrm>
+            <a:off x="548640" y="5943600"/>
+            <a:ext cx="3657600" cy="731520"/>
+          </a:xfrm>
+          <a:prstGeom prst="rect">
+            <a:avLst/>
+          </a:prstGeom>
+          <a:noFill/>
+        </p:spPr>
+        <p:txBody>
+          <a:bodyPr wrap="square">
+            <a:spAutoFit/>
+          </a:bodyPr>
+          <a:lstStyle/>
+          <a:p>
+            <a:pPr>
+              <a:spcAft>
+                <a:spcPts val="600"/>
+              </a:spcAft>
+              <a:defRPr sz="1100">
+                <a:solidFill>
+                  <a:srgbClr val="CCCCCC"/>
+                </a:solidFill>
+                <a:latin typeface="Segoe UI"/>
+              </a:defRPr>
+            </a:pPr>
+            <a:r>
+              <a:t>Stocks → StockUpdated → Catalogue, Notifications</a:t>
+            </a:r>
+          </a:p>
+          <a:p>
+            <a:pPr>
+              <a:spcAft>
+                <a:spcPts val="600"/>
+              </a:spcAft>
+              <a:defRPr sz="1100">
+                <a:solidFill>
+                  <a:srgbClr val="CCCCCC"/>
+                </a:solidFill>
+                <a:latin typeface="Segoe UI"/>
+              </a:defRPr>
+            </a:pPr>
+            <a:r>
+              <a:t>Stocks → StockLow → Admin, Notifications</a:t>
+            </a:r>
+          </a:p>
+        </p:txBody>
+      </p:sp>
+      <p:sp>
+        <p:nvSpPr>
+          <p:cNvPr id="34" name="TextBox 33"/>
+          <p:cNvSpPr txBox="1"/>
+          <p:nvPr/>
+        </p:nvSpPr>
+        <p:spPr>
+          <a:xfrm>
+            <a:off x="4389120" y="5943600"/>
+            <a:ext cx="3657600" cy="731520"/>
+          </a:xfrm>
+          <a:prstGeom prst="rect">
+            <a:avLst/>
+          </a:prstGeom>
+          <a:noFill/>
+        </p:spPr>
+        <p:txBody>
+          <a:bodyPr wrap="square">
+            <a:spAutoFit/>
+          </a:bodyPr>
+          <a:lstStyle/>
+          <a:p>
+            <a:pPr>
+              <a:spcAft>
+                <a:spcPts val="600"/>
+              </a:spcAft>
+              <a:defRPr sz="1100">
+                <a:solidFill>
+                  <a:srgbClr val="CCCCCC"/>
+                </a:solidFill>
+                <a:latin typeface="Segoe UI"/>
+              </a:defRPr>
+            </a:pPr>
+            <a:r>
+              <a:t>Réservation → ReservationCreated → Paiement, Notifications</a:t>
+            </a:r>
+          </a:p>
+          <a:p>
+            <a:pPr>
+              <a:spcAft>
+                <a:spcPts val="600"/>
+              </a:spcAft>
+              <a:defRPr sz="1100">
+                <a:solidFill>
+                  <a:srgbClr val="CCCCCC"/>
+                </a:solidFill>
+                <a:latin typeface="Segoe UI"/>
+              </a:defRPr>
+            </a:pPr>
+            <a:r>
+              <a:t>Paiement → PaymentValidated → Réservation</a:t>
+            </a:r>
+          </a:p>
+        </p:txBody>
+      </p:sp>
+      <p:sp>
+        <p:nvSpPr>
+          <p:cNvPr id="35" name="TextBox 34"/>
+          <p:cNvSpPr txBox="1"/>
+          <p:nvPr/>
+        </p:nvSpPr>
+        <p:spPr>
+          <a:xfrm>
+            <a:off x="8412480" y="5943600"/>
+            <a:ext cx="3200400" cy="731520"/>
+          </a:xfrm>
+          <a:prstGeom prst="rect">
+            <a:avLst/>
+          </a:prstGeom>
+          <a:noFill/>
+        </p:spPr>
+        <p:txBody>
+          <a:bodyPr wrap="square">
+            <a:spAutoFit/>
+          </a:bodyPr>
+          <a:lstStyle/>
+          <a:p>
+            <a:pPr>
+              <a:spcAft>
+                <a:spcPts val="600"/>
+              </a:spcAft>
+              <a:defRPr sz="1100">
+                <a:solidFill>
+                  <a:srgbClr val="CCCCCC"/>
+                </a:solidFill>
+                <a:latin typeface="Segoe UI"/>
+              </a:defRPr>
+            </a:pPr>
+            <a:r>
+              <a:t>Intégration → PriceUpdated → Catalogue</a:t>
+            </a:r>
+          </a:p>
+          <a:p>
+            <a:pPr>
+              <a:spcAft>
+                <a:spcPts val="600"/>
+              </a:spcAft>
+              <a:defRPr sz="1100">
+                <a:solidFill>
+                  <a:srgbClr val="CCCCCC"/>
+                </a:solidFill>
+                <a:latin typeface="Segoe UI"/>
+              </a:defRPr>
+            </a:pPr>
+            <a:r>
+              <a:t>Tous événements → Notifications</a:t>
             </a:r>
           </a:p>
         </p:txBody>
@@ -8403,7 +9352,15 @@
               </a:defRPr>
             </a:pPr>
             <a:r>
-              <a:t>Fondations Git, CI/CD, PostgreSQL</a:t>
+              <a:t>Fondations</a:t>
+            </a:r>
+            <a:br/>
+            <a:r>
+              <a:t>Git, CI/CD</a:t>
+            </a:r>
+            <a:br/>
+            <a:r>
+              <a:t>PostgreSQL</a:t>
             </a:r>
           </a:p>
         </p:txBody>
@@ -8557,7 +9514,11 @@
               </a:defRPr>
             </a:pPr>
             <a:r>
-              <a:t>Module Stocks + RabbitMQ</a:t>
+              <a:t>Stocks</a:t>
+            </a:r>
+            <a:br/>
+            <a:r>
+              <a:t>+ RabbitMQ</a:t>
             </a:r>
           </a:p>
         </p:txBody>
@@ -8711,7 +9672,11 @@
               </a:defRPr>
             </a:pPr>
             <a:r>
-              <a:t>Utilisateurs &amp; Authentification</a:t>
+              <a:t>Utilisateurs</a:t>
+            </a:r>
+            <a:br/>
+            <a:r>
+              <a:t>&amp; Auth</a:t>
             </a:r>
           </a:p>
         </p:txBody>
@@ -8865,7 +9830,11 @@
               </a:defRPr>
             </a:pPr>
             <a:r>
-              <a:t>Catalogue &amp; Réservation</a:t>
+              <a:t>Catalogue</a:t>
+            </a:r>
+            <a:br/>
+            <a:r>
+              <a:t>&amp; Réservation</a:t>
             </a:r>
           </a:p>
         </p:txBody>
@@ -9019,7 +9988,11 @@
               </a:defRPr>
             </a:pPr>
             <a:r>
-              <a:t>Paiement &amp; Notifications</a:t>
+              <a:t>Paiement</a:t>
+            </a:r>
+            <a:br/>
+            <a:r>
+              <a:t>&amp; Notifications</a:t>
             </a:r>
           </a:p>
         </p:txBody>
@@ -9173,7 +10146,11 @@
               </a:defRPr>
             </a:pPr>
             <a:r>
-              <a:t>Marque blanche &amp; i18n</a:t>
+              <a:t>Marque blanche</a:t>
+            </a:r>
+            <a:br/>
+            <a:r>
+              <a:t>&amp; i18n</a:t>
             </a:r>
           </a:p>
         </p:txBody>
@@ -9327,7 +10304,11 @@
               </a:defRPr>
             </a:pPr>
             <a:r>
-              <a:t>Extinction WCF &amp; Legacy</a:t>
+              <a:t>Extinction</a:t>
+            </a:r>
+            <a:br/>
+            <a:r>
+              <a:t>WCF &amp; Legacy</a:t>
             </a:r>
           </a:p>
         </p:txBody>
@@ -10717,7 +11698,11 @@
               </a:defRPr>
             </a:pPr>
             <a:r>
-              <a:t>reservation · stocks</a:t>
+              <a:t>reservation</a:t>
+            </a:r>
+            <a:br/>
+            <a:r>
+              <a:t>stocks</a:t>
             </a:r>
           </a:p>
         </p:txBody>
@@ -10871,7 +11856,11 @@
               </a:defRPr>
             </a:pPr>
             <a:r>
-              <a:t>catalogue · admin</a:t>
+              <a:t>catalogue</a:t>
+            </a:r>
+            <a:br/>
+            <a:r>
+              <a:t>admin</a:t>
             </a:r>
           </a:p>
         </p:txBody>
@@ -11025,7 +12014,11 @@
               </a:defRPr>
             </a:pPr>
             <a:r>
-              <a:t>utilisateurs · marque-blanche</a:t>
+              <a:t>utilisateurs</a:t>
+            </a:r>
+            <a:br/>
+            <a:r>
+              <a:t>marque-blanche</a:t>
             </a:r>
           </a:p>
         </p:txBody>
@@ -11179,7 +12172,11 @@
               </a:defRPr>
             </a:pPr>
             <a:r>
-              <a:t>paiement · intégration</a:t>
+              <a:t>paiement</a:t>
+            </a:r>
+            <a:br/>
+            <a:r>
+              <a:t>intégration</a:t>
             </a:r>
           </a:p>
         </p:txBody>
@@ -11333,7 +12330,11 @@
               </a:defRPr>
             </a:pPr>
             <a:r>
-              <a:t>analytics · Power BI · tests</a:t>
+              <a:t>analytics</a:t>
+            </a:r>
+            <a:br/>
+            <a:r>
+              <a:t>Power BI · tests</a:t>
             </a:r>
           </a:p>
         </p:txBody>
@@ -11939,7 +12940,7 @@
         <p:spPr>
           <a:xfrm>
             <a:off x="731520" y="365760"/>
-            <a:ext cx="4572000" cy="640080"/>
+            <a:ext cx="9144000" cy="640080"/>
           </a:xfrm>
           <a:prstGeom prst="rect">
             <a:avLst/>
@@ -12283,7 +13284,7 @@
         <p:spPr>
           <a:xfrm>
             <a:off x="731520" y="365760"/>
-            <a:ext cx="7315200" cy="640080"/>
+            <a:ext cx="9144000" cy="640080"/>
           </a:xfrm>
           <a:prstGeom prst="rect">
             <a:avLst/>
@@ -12362,8 +13363,8 @@
         </p:nvSpPr>
         <p:spPr>
           <a:xfrm>
-            <a:off x="731520" y="1188720"/>
-            <a:ext cx="4572000" cy="457200"/>
+            <a:off x="731520" y="1097280"/>
+            <a:ext cx="4572000" cy="365760"/>
           </a:xfrm>
           <a:prstGeom prst="rect">
             <a:avLst/>
@@ -12377,7 +13378,7 @@
           <a:lstStyle/>
           <a:p>
             <a:pPr algn="l">
-              <a:defRPr sz="1800" b="1">
+              <a:defRPr sz="1600" b="1">
                 <a:solidFill>
                   <a:srgbClr val="FFD93D"/>
                 </a:solidFill>
@@ -12398,8 +13399,8 @@
         </p:nvSpPr>
         <p:spPr>
           <a:xfrm>
-            <a:off x="731520" y="1645920"/>
-            <a:ext cx="4572000" cy="457200"/>
+            <a:off x="731520" y="1417320"/>
+            <a:ext cx="7315200" cy="365760"/>
           </a:xfrm>
           <a:prstGeom prst="rect">
             <a:avLst/>
@@ -12413,7 +13414,7 @@
           <a:lstStyle/>
           <a:p>
             <a:pPr algn="l">
-              <a:defRPr sz="1400" b="0">
+              <a:defRPr sz="1300" b="0">
                 <a:solidFill>
                   <a:srgbClr val="FF4557"/>
                 </a:solidFill>
@@ -12434,8 +13435,8 @@
         </p:nvSpPr>
         <p:spPr>
           <a:xfrm>
-            <a:off x="731520" y="2286000"/>
-            <a:ext cx="3200400" cy="2286000"/>
+            <a:off x="731520" y="1783080"/>
+            <a:ext cx="3200400" cy="1463040"/>
           </a:xfrm>
           <a:prstGeom prst="roundRect">
             <a:avLst/>
@@ -12480,8 +13481,8 @@
         </p:nvSpPr>
         <p:spPr>
           <a:xfrm>
-            <a:off x="914400" y="2377440"/>
-            <a:ext cx="2834640" cy="457200"/>
+            <a:off x="868680" y="1828800"/>
+            <a:ext cx="2926080" cy="365760"/>
           </a:xfrm>
           <a:prstGeom prst="rect">
             <a:avLst/>
@@ -12495,7 +13496,7 @@
           <a:lstStyle/>
           <a:p>
             <a:pPr algn="ctr">
-              <a:defRPr sz="2200" b="1">
+              <a:defRPr sz="1800" b="1">
                 <a:solidFill>
                   <a:srgbClr val="0096D6"/>
                 </a:solidFill>
@@ -12516,44 +13517,8 @@
         </p:nvSpPr>
         <p:spPr>
           <a:xfrm>
-            <a:off x="914400" y="2926080"/>
-            <a:ext cx="2834640" cy="640080"/>
-          </a:xfrm>
-          <a:prstGeom prst="rect">
-            <a:avLst/>
-          </a:prstGeom>
-          <a:noFill/>
-        </p:spPr>
-        <p:txBody>
-          <a:bodyPr wrap="square">
-            <a:spAutoFit/>
-          </a:bodyPr>
-          <a:lstStyle/>
-          <a:p>
-            <a:pPr algn="ctr">
-              <a:defRPr sz="1400" b="0">
-                <a:solidFill>
-                  <a:srgbClr val="FFFFFF"/>
-                </a:solidFill>
-                <a:latin typeface="Segoe UI"/>
-              </a:defRPr>
-            </a:pPr>
-            <a:r>
-              <a:t>Chef de projet</a:t>
-            </a:r>
-          </a:p>
-        </p:txBody>
-      </p:sp>
-      <p:sp>
-        <p:nvSpPr>
-          <p:cNvPr id="9" name="TextBox 8"/>
-          <p:cNvSpPr txBox="1"/>
-          <p:nvPr/>
-        </p:nvSpPr>
-        <p:spPr>
-          <a:xfrm>
-            <a:off x="914400" y="3566160"/>
-            <a:ext cx="2834640" cy="731520"/>
+            <a:off x="868680" y="2194560"/>
+            <a:ext cx="2926080" cy="365760"/>
           </a:xfrm>
           <a:prstGeom prst="rect">
             <a:avLst/>
@@ -12569,17 +13534,49 @@
             <a:pPr algn="ctr">
               <a:defRPr sz="1200" b="0">
                 <a:solidFill>
+                  <a:srgbClr val="FFFFFF"/>
+                </a:solidFill>
+                <a:latin typeface="Segoe UI"/>
+              </a:defRPr>
+            </a:pPr>
+            <a:r>
+              <a:t>Chef de projet</a:t>
+            </a:r>
+          </a:p>
+        </p:txBody>
+      </p:sp>
+      <p:sp>
+        <p:nvSpPr>
+          <p:cNvPr id="9" name="TextBox 8"/>
+          <p:cNvSpPr txBox="1"/>
+          <p:nvPr/>
+        </p:nvSpPr>
+        <p:spPr>
+          <a:xfrm>
+            <a:off x="868680" y="2560320"/>
+            <a:ext cx="2926080" cy="365760"/>
+          </a:xfrm>
+          <a:prstGeom prst="rect">
+            <a:avLst/>
+          </a:prstGeom>
+          <a:noFill/>
+        </p:spPr>
+        <p:txBody>
+          <a:bodyPr wrap="square">
+            <a:spAutoFit/>
+          </a:bodyPr>
+          <a:lstStyle/>
+          <a:p>
+            <a:pPr algn="ctr">
+              <a:defRPr sz="1100" b="0">
+                <a:solidFill>
                   <a:srgbClr val="AAAABB"/>
                 </a:solidFill>
                 <a:latin typeface="Segoe UI"/>
               </a:defRPr>
             </a:pPr>
             <a:r>
-              <a:t>Coordination, planification,</a:t>
-            </a:r>
-            <a:br/>
-            <a:r>
-              <a:t>suivi des livrables</a:t>
+              <a:t>Coordination, planification</a:t>
             </a:r>
           </a:p>
         </p:txBody>
@@ -12592,8 +13589,8 @@
         </p:nvSpPr>
         <p:spPr>
           <a:xfrm>
-            <a:off x="4389120" y="2286000"/>
-            <a:ext cx="3200400" cy="2286000"/>
+            <a:off x="4389120" y="1783080"/>
+            <a:ext cx="3200400" cy="1463040"/>
           </a:xfrm>
           <a:prstGeom prst="roundRect">
             <a:avLst/>
@@ -12638,8 +13635,8 @@
         </p:nvSpPr>
         <p:spPr>
           <a:xfrm>
-            <a:off x="4572000" y="2377440"/>
-            <a:ext cx="2834640" cy="457200"/>
+            <a:off x="4526280" y="1828800"/>
+            <a:ext cx="2926080" cy="365760"/>
           </a:xfrm>
           <a:prstGeom prst="rect">
             <a:avLst/>
@@ -12653,7 +13650,7 @@
           <a:lstStyle/>
           <a:p>
             <a:pPr algn="ctr">
-              <a:defRPr sz="2200" b="1">
+              <a:defRPr sz="1800" b="1">
                 <a:solidFill>
                   <a:srgbClr val="7C4DFF"/>
                 </a:solidFill>
@@ -12674,48 +13671,8 @@
         </p:nvSpPr>
         <p:spPr>
           <a:xfrm>
-            <a:off x="4572000" y="2926080"/>
-            <a:ext cx="2834640" cy="640080"/>
-          </a:xfrm>
-          <a:prstGeom prst="rect">
-            <a:avLst/>
-          </a:prstGeom>
-          <a:noFill/>
-        </p:spPr>
-        <p:txBody>
-          <a:bodyPr wrap="square">
-            <a:spAutoFit/>
-          </a:bodyPr>
-          <a:lstStyle/>
-          <a:p>
-            <a:pPr algn="ctr">
-              <a:defRPr sz="1400" b="0">
-                <a:solidFill>
-                  <a:srgbClr val="FFFFFF"/>
-                </a:solidFill>
-                <a:latin typeface="Segoe UI"/>
-              </a:defRPr>
-            </a:pPr>
-            <a:r>
-              <a:t>Lead Dev Back-end</a:t>
-            </a:r>
-            <a:br/>
-            <a:r>
-              <a:t>&amp; Maître des BDD</a:t>
-            </a:r>
-          </a:p>
-        </p:txBody>
-      </p:sp>
-      <p:sp>
-        <p:nvSpPr>
-          <p:cNvPr id="13" name="TextBox 12"/>
-          <p:cNvSpPr txBox="1"/>
-          <p:nvPr/>
-        </p:nvSpPr>
-        <p:spPr>
-          <a:xfrm>
-            <a:off x="4572000" y="3566160"/>
-            <a:ext cx="2834640" cy="731520"/>
+            <a:off x="4526280" y="2194560"/>
+            <a:ext cx="2926080" cy="365760"/>
           </a:xfrm>
           <a:prstGeom prst="rect">
             <a:avLst/>
@@ -12731,17 +13688,49 @@
             <a:pPr algn="ctr">
               <a:defRPr sz="1200" b="0">
                 <a:solidFill>
+                  <a:srgbClr val="FFFFFF"/>
+                </a:solidFill>
+                <a:latin typeface="Segoe UI"/>
+              </a:defRPr>
+            </a:pPr>
+            <a:r>
+              <a:t>Lead Back-end &amp; BDD</a:t>
+            </a:r>
+          </a:p>
+        </p:txBody>
+      </p:sp>
+      <p:sp>
+        <p:nvSpPr>
+          <p:cNvPr id="13" name="TextBox 12"/>
+          <p:cNvSpPr txBox="1"/>
+          <p:nvPr/>
+        </p:nvSpPr>
+        <p:spPr>
+          <a:xfrm>
+            <a:off x="4526280" y="2560320"/>
+            <a:ext cx="2926080" cy="365760"/>
+          </a:xfrm>
+          <a:prstGeom prst="rect">
+            <a:avLst/>
+          </a:prstGeom>
+          <a:noFill/>
+        </p:spPr>
+        <p:txBody>
+          <a:bodyPr wrap="square">
+            <a:spAutoFit/>
+          </a:bodyPr>
+          <a:lstStyle/>
+          <a:p>
+            <a:pPr algn="ctr">
+              <a:defRPr sz="1100" b="0">
+                <a:solidFill>
                   <a:srgbClr val="AAAABB"/>
                 </a:solidFill>
                 <a:latin typeface="Segoe UI"/>
               </a:defRPr>
             </a:pPr>
             <a:r>
-              <a:t>Architecture back-end,</a:t>
-            </a:r>
-            <a:br/>
-            <a:r>
-              <a:t>conception BDD</a:t>
+              <a:t>Architecture back-end, BDD</a:t>
             </a:r>
           </a:p>
         </p:txBody>
@@ -12754,8 +13743,8 @@
         </p:nvSpPr>
         <p:spPr>
           <a:xfrm>
-            <a:off x="8046720" y="2286000"/>
-            <a:ext cx="3200400" cy="2286000"/>
+            <a:off x="8046720" y="1783080"/>
+            <a:ext cx="3200400" cy="1463040"/>
           </a:xfrm>
           <a:prstGeom prst="roundRect">
             <a:avLst/>
@@ -12800,8 +13789,8 @@
         </p:nvSpPr>
         <p:spPr>
           <a:xfrm>
-            <a:off x="8229600" y="2377440"/>
-            <a:ext cx="2834640" cy="457200"/>
+            <a:off x="8183880" y="1828800"/>
+            <a:ext cx="2926080" cy="365760"/>
           </a:xfrm>
           <a:prstGeom prst="rect">
             <a:avLst/>
@@ -12815,7 +13804,7 @@
           <a:lstStyle/>
           <a:p>
             <a:pPr algn="ctr">
-              <a:defRPr sz="2200" b="1">
+              <a:defRPr sz="1800" b="1">
                 <a:solidFill>
                   <a:srgbClr val="00C9A7"/>
                 </a:solidFill>
@@ -12836,48 +13825,8 @@
         </p:nvSpPr>
         <p:spPr>
           <a:xfrm>
-            <a:off x="8229600" y="2926080"/>
-            <a:ext cx="2834640" cy="640080"/>
-          </a:xfrm>
-          <a:prstGeom prst="rect">
-            <a:avLst/>
-          </a:prstGeom>
-          <a:noFill/>
-        </p:spPr>
-        <p:txBody>
-          <a:bodyPr wrap="square">
-            <a:spAutoFit/>
-          </a:bodyPr>
-          <a:lstStyle/>
-          <a:p>
-            <a:pPr algn="ctr">
-              <a:defRPr sz="1400" b="0">
-                <a:solidFill>
-                  <a:srgbClr val="FFFFFF"/>
-                </a:solidFill>
-                <a:latin typeface="Segoe UI"/>
-              </a:defRPr>
-            </a:pPr>
-            <a:r>
-              <a:t>Lead Dev Front-end</a:t>
-            </a:r>
-            <a:br/>
-            <a:r>
-              <a:t>&amp; Maître du reste</a:t>
-            </a:r>
-          </a:p>
-        </p:txBody>
-      </p:sp>
-      <p:sp>
-        <p:nvSpPr>
-          <p:cNvPr id="17" name="TextBox 16"/>
-          <p:cNvSpPr txBox="1"/>
-          <p:nvPr/>
-        </p:nvSpPr>
-        <p:spPr>
-          <a:xfrm>
-            <a:off x="8229600" y="3566160"/>
-            <a:ext cx="2834640" cy="731520"/>
+            <a:off x="8183880" y="2194560"/>
+            <a:ext cx="2926080" cy="365760"/>
           </a:xfrm>
           <a:prstGeom prst="rect">
             <a:avLst/>
@@ -12893,17 +13842,49 @@
             <a:pPr algn="ctr">
               <a:defRPr sz="1200" b="0">
                 <a:solidFill>
+                  <a:srgbClr val="FFFFFF"/>
+                </a:solidFill>
+                <a:latin typeface="Segoe UI"/>
+              </a:defRPr>
+            </a:pPr>
+            <a:r>
+              <a:t>Lead Front-end &amp; reste</a:t>
+            </a:r>
+          </a:p>
+        </p:txBody>
+      </p:sp>
+      <p:sp>
+        <p:nvSpPr>
+          <p:cNvPr id="17" name="TextBox 16"/>
+          <p:cNvSpPr txBox="1"/>
+          <p:nvPr/>
+        </p:nvSpPr>
+        <p:spPr>
+          <a:xfrm>
+            <a:off x="8183880" y="2560320"/>
+            <a:ext cx="2926080" cy="365760"/>
+          </a:xfrm>
+          <a:prstGeom prst="rect">
+            <a:avLst/>
+          </a:prstGeom>
+          <a:noFill/>
+        </p:spPr>
+        <p:txBody>
+          <a:bodyPr wrap="square">
+            <a:spAutoFit/>
+          </a:bodyPr>
+          <a:lstStyle/>
+          <a:p>
+            <a:pPr algn="ctr">
+              <a:defRPr sz="1100" b="0">
+                <a:solidFill>
                   <a:srgbClr val="AAAABB"/>
                 </a:solidFill>
                 <a:latin typeface="Segoe UI"/>
               </a:defRPr>
             </a:pPr>
             <a:r>
-              <a:t>Architecture front-end,</a:t>
-            </a:r>
-            <a:br/>
-            <a:r>
-              <a:t>intégrations, transverse</a:t>
+              <a:t>Front-end, intégrations</a:t>
             </a:r>
           </a:p>
         </p:txBody>
@@ -12916,8 +13897,8 @@
         </p:nvSpPr>
         <p:spPr>
           <a:xfrm>
-            <a:off x="731520" y="4846320"/>
-            <a:ext cx="10058400" cy="457200"/>
+            <a:off x="731520" y="3474720"/>
+            <a:ext cx="5029200" cy="365760"/>
           </a:xfrm>
           <a:prstGeom prst="rect">
             <a:avLst/>
@@ -12931,15 +13912,15 @@
           <a:lstStyle/>
           <a:p>
             <a:pPr algn="l">
-              <a:defRPr sz="1600" b="1">
-                <a:solidFill>
-                  <a:srgbClr val="FFD93D"/>
-                </a:solidFill>
-                <a:latin typeface="Segoe UI"/>
-              </a:defRPr>
-            </a:pPr>
-            <a:r>
-              <a:t>Challenges surmontés :</a:t>
+              <a:defRPr sz="1500" b="1">
+                <a:solidFill>
+                  <a:srgbClr val="00C9A7"/>
+                </a:solidFill>
+                <a:latin typeface="Segoe UI"/>
+              </a:defRPr>
+            </a:pPr>
+            <a:r>
+              <a:t>✅ Points forts</a:t>
             </a:r>
           </a:p>
         </p:txBody>
@@ -12952,8 +13933,8 @@
         </p:nvSpPr>
         <p:spPr>
           <a:xfrm>
-            <a:off x="731520" y="5303520"/>
-            <a:ext cx="10058400" cy="1371600"/>
+            <a:off x="731520" y="3794760"/>
+            <a:ext cx="5029200" cy="1371600"/>
           </a:xfrm>
           <a:prstGeom prst="rect">
             <a:avLst/>
@@ -12970,7 +13951,7 @@
               <a:spcAft>
                 <a:spcPts val="600"/>
               </a:spcAft>
-              <a:defRPr sz="1300">
+              <a:defRPr sz="1200">
                 <a:solidFill>
                   <a:srgbClr val="CCCCCC"/>
                 </a:solidFill>
@@ -12978,7 +13959,7 @@
               </a:defRPr>
             </a:pPr>
             <a:r>
-              <a:t>✓ Absorption de la charge (-25%) sans décaler les livrables — synchros hebdomadaires</a:t>
+              <a:t>✓ Absorption de la charge (-25%) sans retard</a:t>
             </a:r>
           </a:p>
           <a:p>
@@ -12986,7 +13967,7 @@
               <a:spcAft>
                 <a:spcPts val="600"/>
               </a:spcAft>
-              <a:defRPr sz="1300">
+              <a:defRPr sz="1200">
                 <a:solidFill>
                   <a:srgbClr val="CCCCCC"/>
                 </a:solidFill>
@@ -12994,7 +13975,7 @@
               </a:defRPr>
             </a:pPr>
             <a:r>
-              <a:t>✓ Cohérence architecturale maintenue grâce à la traçabilité PF → ENF → AXE</a:t>
+              <a:t>✓ Cohérence architecturale (traçabilité PF → ENF → AXE)</a:t>
             </a:r>
           </a:p>
           <a:p>
@@ -13002,7 +13983,7 @@
               <a:spcAft>
                 <a:spcPts val="600"/>
               </a:spcAft>
-              <a:defRPr sz="1300">
+              <a:defRPr sz="1200">
                 <a:solidFill>
                   <a:srgbClr val="CCCCCC"/>
                 </a:solidFill>
@@ -13010,7 +13991,194 @@
               </a:defRPr>
             </a:pPr>
             <a:r>
-              <a:t>✓ Revue croisée systématique de chaque livrable entre les 3 membres</a:t>
+              <a:t>✓ Revue croisée systématique de chaque livrable</a:t>
+            </a:r>
+          </a:p>
+        </p:txBody>
+      </p:sp>
+      <p:sp>
+        <p:nvSpPr>
+          <p:cNvPr id="20" name="TextBox 19"/>
+          <p:cNvSpPr txBox="1"/>
+          <p:nvPr/>
+        </p:nvSpPr>
+        <p:spPr>
+          <a:xfrm>
+            <a:off x="6400800" y="3474720"/>
+            <a:ext cx="5029200" cy="365760"/>
+          </a:xfrm>
+          <a:prstGeom prst="rect">
+            <a:avLst/>
+          </a:prstGeom>
+          <a:noFill/>
+        </p:spPr>
+        <p:txBody>
+          <a:bodyPr wrap="square">
+            <a:spAutoFit/>
+          </a:bodyPr>
+          <a:lstStyle/>
+          <a:p>
+            <a:pPr algn="l">
+              <a:defRPr sz="1500" b="1">
+                <a:solidFill>
+                  <a:srgbClr val="FF6B35"/>
+                </a:solidFill>
+                <a:latin typeface="Segoe UI"/>
+              </a:defRPr>
+            </a:pPr>
+            <a:r>
+              <a:t>📈 Axes d'amélioration du groupe</a:t>
+            </a:r>
+          </a:p>
+        </p:txBody>
+      </p:sp>
+      <p:sp>
+        <p:nvSpPr>
+          <p:cNvPr id="21" name="TextBox 20"/>
+          <p:cNvSpPr txBox="1"/>
+          <p:nvPr/>
+        </p:nvSpPr>
+        <p:spPr>
+          <a:xfrm>
+            <a:off x="6400800" y="3794760"/>
+            <a:ext cx="5029200" cy="2286000"/>
+          </a:xfrm>
+          <a:prstGeom prst="rect">
+            <a:avLst/>
+          </a:prstGeom>
+          <a:noFill/>
+        </p:spPr>
+        <p:txBody>
+          <a:bodyPr wrap="square">
+            <a:spAutoFit/>
+          </a:bodyPr>
+          <a:lstStyle/>
+          <a:p>
+            <a:pPr>
+              <a:spcAft>
+                <a:spcPts val="600"/>
+              </a:spcAft>
+              <a:defRPr sz="1200">
+                <a:solidFill>
+                  <a:srgbClr val="CCCCCC"/>
+                </a:solidFill>
+                <a:latin typeface="Segoe UI"/>
+              </a:defRPr>
+            </a:pPr>
+            <a:r>
+              <a:t>△ Anticiper les risques de départ d'un membre</a:t>
+            </a:r>
+          </a:p>
+          <a:p>
+            <a:pPr>
+              <a:spcAft>
+                <a:spcPts val="600"/>
+              </a:spcAft>
+              <a:defRPr sz="1200">
+                <a:solidFill>
+                  <a:srgbClr val="CCCCCC"/>
+                </a:solidFill>
+                <a:latin typeface="Segoe UI"/>
+              </a:defRPr>
+            </a:pPr>
+            <a:r>
+              <a:t>   (planifier un bus factor ≥ 2 dès le départ)</a:t>
+            </a:r>
+          </a:p>
+          <a:p>
+            <a:pPr>
+              <a:spcAft>
+                <a:spcPts val="600"/>
+              </a:spcAft>
+              <a:defRPr sz="1200">
+                <a:solidFill>
+                  <a:srgbClr val="CCCCCC"/>
+                </a:solidFill>
+                <a:latin typeface="Segoe UI"/>
+              </a:defRPr>
+            </a:pPr>
+            <a:r>
+              <a:t>△ Documenter les décisions d'architecture plus tôt</a:t>
+            </a:r>
+          </a:p>
+          <a:p>
+            <a:pPr>
+              <a:spcAft>
+                <a:spcPts val="600"/>
+              </a:spcAft>
+              <a:defRPr sz="1200">
+                <a:solidFill>
+                  <a:srgbClr val="CCCCCC"/>
+                </a:solidFill>
+                <a:latin typeface="Segoe UI"/>
+              </a:defRPr>
+            </a:pPr>
+            <a:r>
+              <a:t>   (ADR dès la phase de cadrage, pas en rédaction)</a:t>
+            </a:r>
+          </a:p>
+          <a:p>
+            <a:pPr>
+              <a:spcAft>
+                <a:spcPts val="600"/>
+              </a:spcAft>
+              <a:defRPr sz="1200">
+                <a:solidFill>
+                  <a:srgbClr val="CCCCCC"/>
+                </a:solidFill>
+                <a:latin typeface="Segoe UI"/>
+              </a:defRPr>
+            </a:pPr>
+            <a:r>
+              <a:t>△ Renforcer les compétences DevOps dans l'équipe</a:t>
+            </a:r>
+          </a:p>
+          <a:p>
+            <a:pPr>
+              <a:spcAft>
+                <a:spcPts val="600"/>
+              </a:spcAft>
+              <a:defRPr sz="1200">
+                <a:solidFill>
+                  <a:srgbClr val="CCCCCC"/>
+                </a:solidFill>
+                <a:latin typeface="Segoe UI"/>
+              </a:defRPr>
+            </a:pPr>
+            <a:r>
+              <a:t>   (formation CI/CD, conteneurisation, IaC)</a:t>
+            </a:r>
+          </a:p>
+          <a:p>
+            <a:pPr>
+              <a:spcAft>
+                <a:spcPts val="600"/>
+              </a:spcAft>
+              <a:defRPr sz="1200">
+                <a:solidFill>
+                  <a:srgbClr val="CCCCCC"/>
+                </a:solidFill>
+                <a:latin typeface="Segoe UI"/>
+              </a:defRPr>
+            </a:pPr>
+            <a:r>
+              <a:t>△ Formaliser les cérémonies de revue pour pérenniser</a:t>
+            </a:r>
+          </a:p>
+          <a:p>
+            <a:pPr>
+              <a:spcAft>
+                <a:spcPts val="600"/>
+              </a:spcAft>
+              <a:defRPr sz="1200">
+                <a:solidFill>
+                  <a:srgbClr val="CCCCCC"/>
+                </a:solidFill>
+                <a:latin typeface="Segoe UI"/>
+              </a:defRPr>
+            </a:pPr>
+            <a:r>
+              <a:t>   (processus écrit, pas uniquement oral)</a:t>
             </a:r>
           </a:p>
         </p:txBody>
@@ -13050,7 +14218,7 @@
         <p:spPr>
           <a:xfrm>
             <a:off x="731520" y="365760"/>
-            <a:ext cx="7315200" cy="640080"/>
+            <a:ext cx="9144000" cy="640080"/>
           </a:xfrm>
           <a:prstGeom prst="rect">
             <a:avLst/>
@@ -13255,7 +14423,7 @@
               </a:defRPr>
             </a:pPr>
             <a:r>
-              <a:t>• Nouveaux segments : location entre particuliers, B2B grands comptes</a:t>
+              <a:t>• Nouveaux segments : location P2P, B2B grands comptes</a:t>
             </a:r>
           </a:p>
           <a:p>
@@ -13482,7 +14650,7 @@
         <p:spPr>
           <a:xfrm>
             <a:off x="731520" y="365760"/>
-            <a:ext cx="7315200" cy="640080"/>
+            <a:ext cx="9144000" cy="640080"/>
           </a:xfrm>
           <a:prstGeom prst="rect">
             <a:avLst/>
@@ -14450,7 +15618,7 @@
         <p:spPr>
           <a:xfrm>
             <a:off x="731520" y="365760"/>
-            <a:ext cx="7315200" cy="640080"/>
+            <a:ext cx="9144000" cy="640080"/>
           </a:xfrm>
           <a:prstGeom prst="rect">
             <a:avLst/>
@@ -14472,7 +15640,7 @@
               </a:defRPr>
             </a:pPr>
             <a:r>
-              <a:t>3. Analyse du SI existant</a:t>
+              <a:t>3. Schéma du SI existant</a:t>
             </a:r>
           </a:p>
         </p:txBody>
@@ -14529,8 +15697,8 @@
         </p:nvSpPr>
         <p:spPr>
           <a:xfrm>
-            <a:off x="731520" y="1188720"/>
-            <a:ext cx="3291840" cy="2011680"/>
+            <a:off x="457200" y="1188720"/>
+            <a:ext cx="2926080" cy="1371600"/>
           </a:xfrm>
           <a:prstGeom prst="roundRect">
             <a:avLst/>
@@ -14575,8 +15743,8 @@
         </p:nvSpPr>
         <p:spPr>
           <a:xfrm>
-            <a:off x="914400" y="1325880"/>
-            <a:ext cx="2926080" cy="457200"/>
+            <a:off x="640080" y="1234440"/>
+            <a:ext cx="2560320" cy="365760"/>
           </a:xfrm>
           <a:prstGeom prst="rect">
             <a:avLst/>
@@ -14590,7 +15758,7 @@
           <a:lstStyle/>
           <a:p>
             <a:pPr algn="l">
-              <a:defRPr sz="1800" b="1">
+              <a:defRPr sz="1600" b="1">
                 <a:solidFill>
                   <a:srgbClr val="0096D6"/>
                 </a:solidFill>
@@ -14598,7 +15766,7 @@
               </a:defRPr>
             </a:pPr>
             <a:r>
-              <a:t>Front-end</a:t>
+              <a:t>🖥️ Front-end</a:t>
             </a:r>
           </a:p>
         </p:txBody>
@@ -14611,8 +15779,8 @@
         </p:nvSpPr>
         <p:spPr>
           <a:xfrm>
-            <a:off x="914400" y="1828800"/>
-            <a:ext cx="2926080" cy="1188720"/>
+            <a:off x="640080" y="1600200"/>
+            <a:ext cx="2560320" cy="822960"/>
           </a:xfrm>
           <a:prstGeom prst="rect">
             <a:avLst/>
@@ -14626,7 +15794,7 @@
           <a:lstStyle/>
           <a:p>
             <a:pPr algn="l">
-              <a:defRPr sz="1300" b="0">
+              <a:defRPr sz="1100" b="0">
                 <a:solidFill>
                   <a:srgbClr val="CCCCCC"/>
                 </a:solidFill>
@@ -14634,11 +15802,15 @@
               </a:defRPr>
             </a:pPr>
             <a:r>
-              <a:t>Tomcat 8.5 / Spring 5 — Ubuntu 20.04</a:t>
+              <a:t>Tomcat 8.5 / Spring 5</a:t>
             </a:r>
             <a:br/>
             <a:r>
-              <a:t>Logique métier migrée dans le front</a:t>
+              <a:t>Apache (reverse proxy)</a:t>
+            </a:r>
+            <a:br/>
+            <a:r>
+              <a:t>Logique métier migrée ici ⚠️</a:t>
             </a:r>
           </a:p>
         </p:txBody>
@@ -14651,8 +15823,8 @@
         </p:nvSpPr>
         <p:spPr>
           <a:xfrm>
-            <a:off x="4389120" y="1188720"/>
-            <a:ext cx="3291840" cy="2011680"/>
+            <a:off x="4572000" y="1188720"/>
+            <a:ext cx="2926080" cy="1371600"/>
           </a:xfrm>
           <a:prstGeom prst="roundRect">
             <a:avLst/>
@@ -14697,8 +15869,8 @@
         </p:nvSpPr>
         <p:spPr>
           <a:xfrm>
-            <a:off x="4572000" y="1325880"/>
-            <a:ext cx="2926080" cy="457200"/>
+            <a:off x="4754880" y="1234440"/>
+            <a:ext cx="2560320" cy="365760"/>
           </a:xfrm>
           <a:prstGeom prst="rect">
             <a:avLst/>
@@ -14712,7 +15884,7 @@
           <a:lstStyle/>
           <a:p>
             <a:pPr algn="l">
-              <a:defRPr sz="1800" b="1">
+              <a:defRPr sz="1600" b="1">
                 <a:solidFill>
                   <a:srgbClr val="7C4DFF"/>
                 </a:solidFill>
@@ -14720,7 +15892,7 @@
               </a:defRPr>
             </a:pPr>
             <a:r>
-              <a:t>Back-end</a:t>
+              <a:t>⚙️ Back-end</a:t>
             </a:r>
           </a:p>
         </p:txBody>
@@ -14733,8 +15905,8 @@
         </p:nvSpPr>
         <p:spPr>
           <a:xfrm>
-            <a:off x="4572000" y="1828800"/>
-            <a:ext cx="2926080" cy="1188720"/>
+            <a:off x="4754880" y="1600200"/>
+            <a:ext cx="2560320" cy="822960"/>
           </a:xfrm>
           <a:prstGeom prst="rect">
             <a:avLst/>
@@ -14748,7 +15920,7 @@
           <a:lstStyle/>
           <a:p>
             <a:pPr algn="l">
-              <a:defRPr sz="1300" b="0">
+              <a:defRPr sz="1100" b="0">
                 <a:solidFill>
                   <a:srgbClr val="CCCCCC"/>
                 </a:solidFill>
@@ -14761,6 +15933,10 @@
             <a:br/>
             <a:r>
               <a:t>Oracle Linux 6.5 (EOL)</a:t>
+            </a:r>
+            <a:br/>
+            <a:r>
+              <a:t>EJB / JPA legacy</a:t>
             </a:r>
           </a:p>
         </p:txBody>
@@ -14773,8 +15949,8 @@
         </p:nvSpPr>
         <p:spPr>
           <a:xfrm>
-            <a:off x="8046720" y="1188720"/>
-            <a:ext cx="3291840" cy="2011680"/>
+            <a:off x="2286000" y="3383280"/>
+            <a:ext cx="3657600" cy="1371600"/>
           </a:xfrm>
           <a:prstGeom prst="roundRect">
             <a:avLst/>
@@ -14819,8 +15995,8 @@
         </p:nvSpPr>
         <p:spPr>
           <a:xfrm>
-            <a:off x="8229600" y="1325880"/>
-            <a:ext cx="2926080" cy="457200"/>
+            <a:off x="2468880" y="3429000"/>
+            <a:ext cx="3291840" cy="365760"/>
           </a:xfrm>
           <a:prstGeom prst="rect">
             <a:avLst/>
@@ -14834,7 +16010,7 @@
           <a:lstStyle/>
           <a:p>
             <a:pPr algn="l">
-              <a:defRPr sz="1800" b="1">
+              <a:defRPr sz="1400" b="1">
                 <a:solidFill>
                   <a:srgbClr val="FF6B35"/>
                 </a:solidFill>
@@ -14842,7 +16018,7 @@
               </a:defRPr>
             </a:pPr>
             <a:r>
-              <a:t>BDD</a:t>
+              <a:t>🗄️ Oracle 11g R2 (Cluster 2 nœuds)</a:t>
             </a:r>
           </a:p>
         </p:txBody>
@@ -14855,8 +16031,8 @@
         </p:nvSpPr>
         <p:spPr>
           <a:xfrm>
-            <a:off x="8229600" y="1828800"/>
-            <a:ext cx="2926080" cy="1188720"/>
+            <a:off x="2468880" y="3794760"/>
+            <a:ext cx="3291840" cy="822960"/>
           </a:xfrm>
           <a:prstGeom prst="rect">
             <a:avLst/>
@@ -14870,7 +16046,7 @@
           <a:lstStyle/>
           <a:p>
             <a:pPr algn="l">
-              <a:defRPr sz="1300" b="0">
+              <a:defRPr sz="1100" b="0">
                 <a:solidFill>
                   <a:srgbClr val="CCCCCC"/>
                 </a:solidFill>
@@ -14878,11 +16054,15 @@
               </a:defRPr>
             </a:pPr>
             <a:r>
-              <a:t>Oracle 11g R2 — Cluster 2 nœuds</a:t>
+              <a:t>bricolocDB · autorisationDB · prixDB</a:t>
             </a:r>
             <a:br/>
             <a:r>
               <a:t>Tables &gt; 150 colonnes, PL/SQL métier</a:t>
+            </a:r>
+            <a:br/>
+            <a:r>
+              <a:t>Coût licences élevé</a:t>
             </a:r>
           </a:p>
         </p:txBody>
@@ -14895,8 +16075,8 @@
         </p:nvSpPr>
         <p:spPr>
           <a:xfrm>
-            <a:off x="731520" y="3749039"/>
-            <a:ext cx="3291840" cy="2011680"/>
+            <a:off x="8686800" y="1188720"/>
+            <a:ext cx="3200400" cy="1371600"/>
           </a:xfrm>
           <a:prstGeom prst="roundRect">
             <a:avLst/>
@@ -14941,8 +16121,8 @@
         </p:nvSpPr>
         <p:spPr>
           <a:xfrm>
-            <a:off x="914400" y="3886199"/>
-            <a:ext cx="2926080" cy="457200"/>
+            <a:off x="8869680" y="1234440"/>
+            <a:ext cx="2834640" cy="365760"/>
           </a:xfrm>
           <a:prstGeom prst="rect">
             <a:avLst/>
@@ -14956,7 +16136,7 @@
           <a:lstStyle/>
           <a:p>
             <a:pPr algn="l">
-              <a:defRPr sz="1800" b="1">
+              <a:defRPr sz="1600" b="1">
                 <a:solidFill>
                   <a:srgbClr val="FF4557"/>
                 </a:solidFill>
@@ -14964,7 +16144,7 @@
               </a:defRPr>
             </a:pPr>
             <a:r>
-              <a:t>Stocks</a:t>
+              <a:t>📦 Stocks &amp; SAP</a:t>
             </a:r>
           </a:p>
         </p:txBody>
@@ -14977,8 +16157,8 @@
         </p:nvSpPr>
         <p:spPr>
           <a:xfrm>
-            <a:off x="914400" y="4389119"/>
-            <a:ext cx="2926080" cy="1188720"/>
+            <a:off x="8869680" y="1600200"/>
+            <a:ext cx="2834640" cy="822960"/>
           </a:xfrm>
           <a:prstGeom prst="rect">
             <a:avLst/>
@@ -14992,7 +16172,7 @@
           <a:lstStyle/>
           <a:p>
             <a:pPr algn="l">
-              <a:defRPr sz="1300" b="0">
+              <a:defRPr sz="1100" b="0">
                 <a:solidFill>
                   <a:srgbClr val="CCCCCC"/>
                 </a:solidFill>
@@ -15000,11 +16180,15 @@
               </a:defRPr>
             </a:pPr>
             <a:r>
-              <a:t>Batch CSV quotidien SAP → PL/SQL</a:t>
+              <a:t>SAP B1 9.X → CSV quotidien</a:t>
             </a:r>
             <a:br/>
             <a:r>
-              <a:t>+ Client lourd C# → WCF VB.NET</a:t>
+              <a:t>Batch Java → PL/SQL</a:t>
+            </a:r>
+            <a:br/>
+            <a:r>
+              <a:t>WCF VB.NET (code perdu!) ☠️</a:t>
             </a:r>
           </a:p>
         </p:txBody>
@@ -15017,8 +16201,8 @@
         </p:nvSpPr>
         <p:spPr>
           <a:xfrm>
-            <a:off x="4389120" y="3749039"/>
-            <a:ext cx="3291840" cy="2011680"/>
+            <a:off x="8686800" y="3383280"/>
+            <a:ext cx="3200400" cy="1371600"/>
           </a:xfrm>
           <a:prstGeom prst="roundRect">
             <a:avLst/>
@@ -15063,84 +16247,8 @@
         </p:nvSpPr>
         <p:spPr>
           <a:xfrm>
-            <a:off x="4572000" y="3886199"/>
-            <a:ext cx="2926080" cy="457200"/>
-          </a:xfrm>
-          <a:prstGeom prst="rect">
-            <a:avLst/>
-          </a:prstGeom>
-          <a:noFill/>
-        </p:spPr>
-        <p:txBody>
-          <a:bodyPr wrap="square">
-            <a:spAutoFit/>
-          </a:bodyPr>
-          <a:lstStyle/>
-          <a:p>
-            <a:pPr algn="l">
-              <a:defRPr sz="1800" b="1">
-                <a:solidFill>
-                  <a:srgbClr val="00B4D8"/>
-                </a:solidFill>
-                <a:latin typeface="Segoe UI"/>
-              </a:defRPr>
-            </a:pPr>
-            <a:r>
-              <a:t>Infra</a:t>
-            </a:r>
-          </a:p>
-        </p:txBody>
-      </p:sp>
-      <p:sp>
-        <p:nvSpPr>
-          <p:cNvPr id="18" name="TextBox 17"/>
-          <p:cNvSpPr txBox="1"/>
-          <p:nvPr/>
-        </p:nvSpPr>
-        <p:spPr>
-          <a:xfrm>
-            <a:off x="4572000" y="4389119"/>
-            <a:ext cx="2926080" cy="1188720"/>
-          </a:xfrm>
-          <a:prstGeom prst="rect">
-            <a:avLst/>
-          </a:prstGeom>
-          <a:noFill/>
-        </p:spPr>
-        <p:txBody>
-          <a:bodyPr wrap="square">
-            <a:spAutoFit/>
-          </a:bodyPr>
-          <a:lstStyle/>
-          <a:p>
-            <a:pPr algn="l">
-              <a:defRPr sz="1300" b="0">
-                <a:solidFill>
-                  <a:srgbClr val="CCCCCC"/>
-                </a:solidFill>
-                <a:latin typeface="Segoe UI"/>
-              </a:defRPr>
-            </a:pPr>
-            <a:r>
-              <a:t>FTP sans Git · VM fantôme</a:t>
-            </a:r>
-            <a:br/>
-            <a:r>
-              <a:t>AD · Exchange · SAP B1 · Power BI</a:t>
-            </a:r>
-          </a:p>
-        </p:txBody>
-      </p:sp>
-      <p:sp>
-        <p:nvSpPr>
-          <p:cNvPr id="19" name="TextBox 18"/>
-          <p:cNvSpPr txBox="1"/>
-          <p:nvPr/>
-        </p:nvSpPr>
-        <p:spPr>
-          <a:xfrm>
-            <a:off x="731520" y="6217920"/>
-            <a:ext cx="10058400" cy="457200"/>
+            <a:off x="8869680" y="3429000"/>
+            <a:ext cx="2834640" cy="365760"/>
           </a:xfrm>
           <a:prstGeom prst="rect">
             <a:avLst/>
@@ -15156,13 +16264,685 @@
             <a:pPr algn="l">
               <a:defRPr sz="1600" b="1">
                 <a:solidFill>
+                  <a:srgbClr val="00B4D8"/>
+                </a:solidFill>
+                <a:latin typeface="Segoe UI"/>
+              </a:defRPr>
+            </a:pPr>
+            <a:r>
+              <a:t>🏗️ Infra</a:t>
+            </a:r>
+          </a:p>
+        </p:txBody>
+      </p:sp>
+      <p:sp>
+        <p:nvSpPr>
+          <p:cNvPr id="18" name="TextBox 17"/>
+          <p:cNvSpPr txBox="1"/>
+          <p:nvPr/>
+        </p:nvSpPr>
+        <p:spPr>
+          <a:xfrm>
+            <a:off x="8869680" y="3794760"/>
+            <a:ext cx="2834640" cy="822960"/>
+          </a:xfrm>
+          <a:prstGeom prst="rect">
+            <a:avLst/>
+          </a:prstGeom>
+          <a:noFill/>
+        </p:spPr>
+        <p:txBody>
+          <a:bodyPr wrap="square">
+            <a:spAutoFit/>
+          </a:bodyPr>
+          <a:lstStyle/>
+          <a:p>
+            <a:pPr algn="l">
+              <a:defRPr sz="1100" b="0">
+                <a:solidFill>
+                  <a:srgbClr val="CCCCCC"/>
+                </a:solidFill>
+                <a:latin typeface="Segoe UI"/>
+              </a:defRPr>
+            </a:pPr>
+            <a:r>
+              <a:t>FTP (pas de Git!) · VM fantôme</a:t>
+            </a:r>
+            <a:br/>
+            <a:r>
+              <a:t>Active Directory · Exchange</a:t>
+            </a:r>
+            <a:br/>
+            <a:r>
+              <a:t>Partages fichiers + CSV</a:t>
+            </a:r>
+          </a:p>
+        </p:txBody>
+      </p:sp>
+      <p:sp>
+        <p:nvSpPr>
+          <p:cNvPr id="19" name="Right Arrow 18"/>
+          <p:cNvSpPr/>
+          <p:nvPr/>
+        </p:nvSpPr>
+        <p:spPr>
+          <a:xfrm>
+            <a:off x="3383280" y="1691640"/>
+            <a:ext cx="1097280" cy="274320"/>
+          </a:xfrm>
+          <a:prstGeom prst="rightArrow">
+            <a:avLst/>
+          </a:prstGeom>
+          <a:solidFill>
+            <a:srgbClr val="0096D6"/>
+          </a:solidFill>
+          <a:ln>
+            <a:noFill/>
+          </a:ln>
+          <a:effectLst/>
+        </p:spPr>
+        <p:style>
+          <a:lnRef idx="1">
+            <a:schemeClr val="accent1"/>
+          </a:lnRef>
+          <a:fillRef idx="3">
+            <a:schemeClr val="accent1"/>
+          </a:fillRef>
+          <a:effectRef idx="2">
+            <a:schemeClr val="accent1"/>
+          </a:effectRef>
+          <a:fontRef idx="minor">
+            <a:schemeClr val="lt1"/>
+          </a:fontRef>
+        </p:style>
+        <p:txBody>
+          <a:bodyPr rtlCol="0" anchor="ctr"/>
+          <a:lstStyle/>
+          <a:p>
+            <a:pPr algn="ctr"/>
+          </a:p>
+        </p:txBody>
+      </p:sp>
+      <p:sp>
+        <p:nvSpPr>
+          <p:cNvPr id="20" name="TextBox 19"/>
+          <p:cNvSpPr txBox="1"/>
+          <p:nvPr/>
+        </p:nvSpPr>
+        <p:spPr>
+          <a:xfrm>
+            <a:off x="3474720" y="1417320"/>
+            <a:ext cx="914400" cy="274320"/>
+          </a:xfrm>
+          <a:prstGeom prst="rect">
+            <a:avLst/>
+          </a:prstGeom>
+          <a:noFill/>
+        </p:spPr>
+        <p:txBody>
+          <a:bodyPr wrap="square">
+            <a:spAutoFit/>
+          </a:bodyPr>
+          <a:lstStyle/>
+          <a:p>
+            <a:pPr algn="ctr">
+              <a:defRPr sz="1000" b="1">
+                <a:solidFill>
+                  <a:srgbClr val="0096D6"/>
+                </a:solidFill>
+                <a:latin typeface="Segoe UI"/>
+              </a:defRPr>
+            </a:pPr>
+            <a:r>
+              <a:t>SOAP</a:t>
+            </a:r>
+          </a:p>
+        </p:txBody>
+      </p:sp>
+      <p:sp>
+        <p:nvSpPr>
+          <p:cNvPr id="21" name="Down Arrow 20"/>
+          <p:cNvSpPr/>
+          <p:nvPr/>
+        </p:nvSpPr>
+        <p:spPr>
+          <a:xfrm>
+            <a:off x="1645920" y="2606040"/>
+            <a:ext cx="320040" cy="731520"/>
+          </a:xfrm>
+          <a:prstGeom prst="downArrow">
+            <a:avLst/>
+          </a:prstGeom>
+          <a:solidFill>
+            <a:srgbClr val="FF4557"/>
+          </a:solidFill>
+          <a:ln>
+            <a:noFill/>
+          </a:ln>
+          <a:effectLst/>
+        </p:spPr>
+        <p:style>
+          <a:lnRef idx="1">
+            <a:schemeClr val="accent1"/>
+          </a:lnRef>
+          <a:fillRef idx="3">
+            <a:schemeClr val="accent1"/>
+          </a:fillRef>
+          <a:effectRef idx="2">
+            <a:schemeClr val="accent1"/>
+          </a:effectRef>
+          <a:fontRef idx="minor">
+            <a:schemeClr val="lt1"/>
+          </a:fontRef>
+        </p:style>
+        <p:txBody>
+          <a:bodyPr rtlCol="0" anchor="ctr"/>
+          <a:lstStyle/>
+          <a:p>
+            <a:pPr algn="ctr"/>
+          </a:p>
+        </p:txBody>
+      </p:sp>
+      <p:sp>
+        <p:nvSpPr>
+          <p:cNvPr id="22" name="TextBox 21"/>
+          <p:cNvSpPr txBox="1"/>
+          <p:nvPr/>
+        </p:nvSpPr>
+        <p:spPr>
+          <a:xfrm>
+            <a:off x="457200" y="2743200"/>
+            <a:ext cx="1645920" cy="457200"/>
+          </a:xfrm>
+          <a:prstGeom prst="rect">
+            <a:avLst/>
+          </a:prstGeom>
+          <a:noFill/>
+        </p:spPr>
+        <p:txBody>
+          <a:bodyPr wrap="square">
+            <a:spAutoFit/>
+          </a:bodyPr>
+          <a:lstStyle/>
+          <a:p>
+            <a:pPr algn="l">
+              <a:defRPr sz="900" b="1">
+                <a:solidFill>
                   <a:srgbClr val="FF4557"/>
                 </a:solidFill>
                 <a:latin typeface="Segoe UI"/>
               </a:defRPr>
             </a:pPr>
             <a:r>
+              <a:t>JDBC direct ⚠️</a:t>
+            </a:r>
+            <a:br/>
+            <a:r>
+              <a:t>(violation archi)</a:t>
+            </a:r>
+          </a:p>
+        </p:txBody>
+      </p:sp>
+      <p:sp>
+        <p:nvSpPr>
+          <p:cNvPr id="23" name="Down Arrow 22"/>
+          <p:cNvSpPr/>
+          <p:nvPr/>
+        </p:nvSpPr>
+        <p:spPr>
+          <a:xfrm>
+            <a:off x="5760720" y="2606040"/>
+            <a:ext cx="320040" cy="731520"/>
+          </a:xfrm>
+          <a:prstGeom prst="downArrow">
+            <a:avLst/>
+          </a:prstGeom>
+          <a:solidFill>
+            <a:srgbClr val="7C4DFF"/>
+          </a:solidFill>
+          <a:ln>
+            <a:noFill/>
+          </a:ln>
+          <a:effectLst/>
+        </p:spPr>
+        <p:style>
+          <a:lnRef idx="1">
+            <a:schemeClr val="accent1"/>
+          </a:lnRef>
+          <a:fillRef idx="3">
+            <a:schemeClr val="accent1"/>
+          </a:fillRef>
+          <a:effectRef idx="2">
+            <a:schemeClr val="accent1"/>
+          </a:effectRef>
+          <a:fontRef idx="minor">
+            <a:schemeClr val="lt1"/>
+          </a:fontRef>
+        </p:style>
+        <p:txBody>
+          <a:bodyPr rtlCol="0" anchor="ctr"/>
+          <a:lstStyle/>
+          <a:p>
+            <a:pPr algn="ctr"/>
+          </a:p>
+        </p:txBody>
+      </p:sp>
+      <p:sp>
+        <p:nvSpPr>
+          <p:cNvPr id="24" name="TextBox 23"/>
+          <p:cNvSpPr txBox="1"/>
+          <p:nvPr/>
+        </p:nvSpPr>
+        <p:spPr>
+          <a:xfrm>
+            <a:off x="6126480" y="2743200"/>
+            <a:ext cx="1371600" cy="274320"/>
+          </a:xfrm>
+          <a:prstGeom prst="rect">
+            <a:avLst/>
+          </a:prstGeom>
+          <a:noFill/>
+        </p:spPr>
+        <p:txBody>
+          <a:bodyPr wrap="square">
+            <a:spAutoFit/>
+          </a:bodyPr>
+          <a:lstStyle/>
+          <a:p>
+            <a:pPr algn="l">
+              <a:defRPr sz="1000" b="0">
+                <a:solidFill>
+                  <a:srgbClr val="7C4DFF"/>
+                </a:solidFill>
+                <a:latin typeface="Segoe UI"/>
+              </a:defRPr>
+            </a:pPr>
+            <a:r>
+              <a:t>JDBC / JPA</a:t>
+            </a:r>
+          </a:p>
+        </p:txBody>
+      </p:sp>
+      <p:sp>
+        <p:nvSpPr>
+          <p:cNvPr id="25" name="Right Arrow 24"/>
+          <p:cNvSpPr/>
+          <p:nvPr/>
+        </p:nvSpPr>
+        <p:spPr>
+          <a:xfrm>
+            <a:off x="7589520" y="1828800"/>
+            <a:ext cx="1005840" cy="274320"/>
+          </a:xfrm>
+          <a:prstGeom prst="rightArrow">
+            <a:avLst/>
+          </a:prstGeom>
+          <a:solidFill>
+            <a:srgbClr val="FF4557"/>
+          </a:solidFill>
+          <a:ln>
+            <a:noFill/>
+          </a:ln>
+          <a:effectLst/>
+        </p:spPr>
+        <p:style>
+          <a:lnRef idx="1">
+            <a:schemeClr val="accent1"/>
+          </a:lnRef>
+          <a:fillRef idx="3">
+            <a:schemeClr val="accent1"/>
+          </a:fillRef>
+          <a:effectRef idx="2">
+            <a:schemeClr val="accent1"/>
+          </a:effectRef>
+          <a:fontRef idx="minor">
+            <a:schemeClr val="lt1"/>
+          </a:fontRef>
+        </p:style>
+        <p:txBody>
+          <a:bodyPr rtlCol="0" anchor="ctr"/>
+          <a:lstStyle/>
+          <a:p>
+            <a:pPr algn="ctr"/>
+          </a:p>
+        </p:txBody>
+      </p:sp>
+      <p:sp>
+        <p:nvSpPr>
+          <p:cNvPr id="26" name="TextBox 25"/>
+          <p:cNvSpPr txBox="1"/>
+          <p:nvPr/>
+        </p:nvSpPr>
+        <p:spPr>
+          <a:xfrm>
+            <a:off x="7223760" y="2103120"/>
+            <a:ext cx="1828800" cy="274320"/>
+          </a:xfrm>
+          <a:prstGeom prst="rect">
+            <a:avLst/>
+          </a:prstGeom>
+          <a:noFill/>
+        </p:spPr>
+        <p:txBody>
+          <a:bodyPr wrap="square">
+            <a:spAutoFit/>
+          </a:bodyPr>
+          <a:lstStyle/>
+          <a:p>
+            <a:pPr algn="ctr">
+              <a:defRPr sz="900" b="0">
+                <a:solidFill>
+                  <a:srgbClr val="FF4557"/>
+                </a:solidFill>
+                <a:latin typeface="Segoe UI"/>
+              </a:defRPr>
+            </a:pPr>
+            <a:r>
+              <a:t>← Batch CSV →</a:t>
+            </a:r>
+          </a:p>
+        </p:txBody>
+      </p:sp>
+      <p:sp>
+        <p:nvSpPr>
+          <p:cNvPr id="27" name="Down Arrow 26"/>
+          <p:cNvSpPr/>
+          <p:nvPr/>
+        </p:nvSpPr>
+        <p:spPr>
+          <a:xfrm>
+            <a:off x="9875520" y="2606040"/>
+            <a:ext cx="320040" cy="731520"/>
+          </a:xfrm>
+          <a:prstGeom prst="downArrow">
+            <a:avLst/>
+          </a:prstGeom>
+          <a:solidFill>
+            <a:srgbClr val="FF4557"/>
+          </a:solidFill>
+          <a:ln>
+            <a:noFill/>
+          </a:ln>
+          <a:effectLst/>
+        </p:spPr>
+        <p:style>
+          <a:lnRef idx="1">
+            <a:schemeClr val="accent1"/>
+          </a:lnRef>
+          <a:fillRef idx="3">
+            <a:schemeClr val="accent1"/>
+          </a:fillRef>
+          <a:effectRef idx="2">
+            <a:schemeClr val="accent1"/>
+          </a:effectRef>
+          <a:fontRef idx="minor">
+            <a:schemeClr val="lt1"/>
+          </a:fontRef>
+        </p:style>
+        <p:txBody>
+          <a:bodyPr rtlCol="0" anchor="ctr"/>
+          <a:lstStyle/>
+          <a:p>
+            <a:pPr algn="ctr"/>
+          </a:p>
+        </p:txBody>
+      </p:sp>
+      <p:sp>
+        <p:nvSpPr>
+          <p:cNvPr id="28" name="TextBox 27"/>
+          <p:cNvSpPr txBox="1"/>
+          <p:nvPr/>
+        </p:nvSpPr>
+        <p:spPr>
+          <a:xfrm>
+            <a:off x="9144000" y="2926080"/>
+            <a:ext cx="1371600" cy="274320"/>
+          </a:xfrm>
+          <a:prstGeom prst="rect">
+            <a:avLst/>
+          </a:prstGeom>
+          <a:noFill/>
+        </p:spPr>
+        <p:txBody>
+          <a:bodyPr wrap="square">
+            <a:spAutoFit/>
+          </a:bodyPr>
+          <a:lstStyle/>
+          <a:p>
+            <a:pPr algn="l">
+              <a:defRPr sz="1000" b="0">
+                <a:solidFill>
+                  <a:srgbClr val="FF4557"/>
+                </a:solidFill>
+                <a:latin typeface="Segoe UI"/>
+              </a:defRPr>
+            </a:pPr>
+            <a:r>
+              <a:t>PL/SQL</a:t>
+            </a:r>
+          </a:p>
+        </p:txBody>
+      </p:sp>
+      <p:sp>
+        <p:nvSpPr>
+          <p:cNvPr id="29" name="Rounded Rectangle 28"/>
+          <p:cNvSpPr/>
+          <p:nvPr/>
+        </p:nvSpPr>
+        <p:spPr>
+          <a:xfrm>
+            <a:off x="457200" y="5029200"/>
+            <a:ext cx="11247120" cy="1554480"/>
+          </a:xfrm>
+          <a:prstGeom prst="roundRect">
+            <a:avLst/>
+          </a:prstGeom>
+          <a:solidFill>
+            <a:srgbClr val="251515"/>
+          </a:solidFill>
+          <a:ln w="25400">
+            <a:solidFill>
+              <a:srgbClr val="FF4557"/>
+            </a:solidFill>
+          </a:ln>
+          <a:effectLst/>
+        </p:spPr>
+        <p:style>
+          <a:lnRef idx="1">
+            <a:schemeClr val="accent1"/>
+          </a:lnRef>
+          <a:fillRef idx="3">
+            <a:schemeClr val="accent1"/>
+          </a:fillRef>
+          <a:effectRef idx="2">
+            <a:schemeClr val="accent1"/>
+          </a:effectRef>
+          <a:fontRef idx="minor">
+            <a:schemeClr val="lt1"/>
+          </a:fontRef>
+        </p:style>
+        <p:txBody>
+          <a:bodyPr rtlCol="0" anchor="ctr"/>
+          <a:lstStyle/>
+          <a:p>
+            <a:pPr algn="ctr"/>
+          </a:p>
+        </p:txBody>
+      </p:sp>
+      <p:sp>
+        <p:nvSpPr>
+          <p:cNvPr id="30" name="TextBox 29"/>
+          <p:cNvSpPr txBox="1"/>
+          <p:nvPr/>
+        </p:nvSpPr>
+        <p:spPr>
+          <a:xfrm>
+            <a:off x="640080" y="5074920"/>
+            <a:ext cx="10515600" cy="365760"/>
+          </a:xfrm>
+          <a:prstGeom prst="rect">
+            <a:avLst/>
+          </a:prstGeom>
+          <a:noFill/>
+        </p:spPr>
+        <p:txBody>
+          <a:bodyPr wrap="square">
+            <a:spAutoFit/>
+          </a:bodyPr>
+          <a:lstStyle/>
+          <a:p>
+            <a:pPr algn="l">
+              <a:defRPr sz="1600" b="1">
+                <a:solidFill>
+                  <a:srgbClr val="FF4557"/>
+                </a:solidFill>
+                <a:latin typeface="Segoe UI"/>
+              </a:defRPr>
+            </a:pPr>
+            <a:r>
               <a:t>⚠️ 9 anomalies architecturales majeures identifiées</a:t>
+            </a:r>
+          </a:p>
+        </p:txBody>
+      </p:sp>
+      <p:sp>
+        <p:nvSpPr>
+          <p:cNvPr id="31" name="TextBox 30"/>
+          <p:cNvSpPr txBox="1"/>
+          <p:nvPr/>
+        </p:nvSpPr>
+        <p:spPr>
+          <a:xfrm>
+            <a:off x="640080" y="5440680"/>
+            <a:ext cx="5029200" cy="1097280"/>
+          </a:xfrm>
+          <a:prstGeom prst="rect">
+            <a:avLst/>
+          </a:prstGeom>
+          <a:noFill/>
+        </p:spPr>
+        <p:txBody>
+          <a:bodyPr wrap="square">
+            <a:spAutoFit/>
+          </a:bodyPr>
+          <a:lstStyle/>
+          <a:p>
+            <a:pPr>
+              <a:spcAft>
+                <a:spcPts val="600"/>
+              </a:spcAft>
+              <a:defRPr sz="1100">
+                <a:solidFill>
+                  <a:srgbClr val="CCCCCC"/>
+                </a:solidFill>
+                <a:latin typeface="Segoe UI"/>
+              </a:defRPr>
+            </a:pPr>
+            <a:r>
+              <a:t>🔴 Accès JDBC direct du front vers la BDD (contourne le back-end)</a:t>
+            </a:r>
+          </a:p>
+          <a:p>
+            <a:pPr>
+              <a:spcAft>
+                <a:spcPts val="600"/>
+              </a:spcAft>
+              <a:defRPr sz="1100">
+                <a:solidFill>
+                  <a:srgbClr val="CCCCCC"/>
+                </a:solidFill>
+                <a:latin typeface="Segoe UI"/>
+              </a:defRPr>
+            </a:pPr>
+            <a:r>
+              <a:t>🔴 Logique métier éparpillée : front + back + BDD (PL/SQL)</a:t>
+            </a:r>
+          </a:p>
+          <a:p>
+            <a:pPr>
+              <a:spcAft>
+                <a:spcPts val="600"/>
+              </a:spcAft>
+              <a:defRPr sz="1100">
+                <a:solidFill>
+                  <a:srgbClr val="CCCCCC"/>
+                </a:solidFill>
+                <a:latin typeface="Segoe UI"/>
+              </a:defRPr>
+            </a:pPr>
+            <a:r>
+              <a:t>🔴 WCF VB.NET sans code source — SPOF sur la gestion stocks</a:t>
+            </a:r>
+          </a:p>
+        </p:txBody>
+      </p:sp>
+      <p:sp>
+        <p:nvSpPr>
+          <p:cNvPr id="32" name="TextBox 31"/>
+          <p:cNvSpPr txBox="1"/>
+          <p:nvPr/>
+        </p:nvSpPr>
+        <p:spPr>
+          <a:xfrm>
+            <a:off x="5943600" y="5440680"/>
+            <a:ext cx="5486400" cy="1097280"/>
+          </a:xfrm>
+          <a:prstGeom prst="rect">
+            <a:avLst/>
+          </a:prstGeom>
+          <a:noFill/>
+        </p:spPr>
+        <p:txBody>
+          <a:bodyPr wrap="square">
+            <a:spAutoFit/>
+          </a:bodyPr>
+          <a:lstStyle/>
+          <a:p>
+            <a:pPr>
+              <a:spcAft>
+                <a:spcPts val="600"/>
+              </a:spcAft>
+              <a:defRPr sz="1100">
+                <a:solidFill>
+                  <a:srgbClr val="CCCCCC"/>
+                </a:solidFill>
+                <a:latin typeface="Segoe UI"/>
+              </a:defRPr>
+            </a:pPr>
+            <a:r>
+              <a:t>🔴 Batch CSV quotidien SAP → 24h de latence sur les stocks</a:t>
+            </a:r>
+          </a:p>
+          <a:p>
+            <a:pPr>
+              <a:spcAft>
+                <a:spcPts val="600"/>
+              </a:spcAft>
+              <a:defRPr sz="1100">
+                <a:solidFill>
+                  <a:srgbClr val="CCCCCC"/>
+                </a:solidFill>
+                <a:latin typeface="Segoe UI"/>
+              </a:defRPr>
+            </a:pPr>
+            <a:r>
+              <a:t>🔴 FTP sans Git — aucun contrôle de version</a:t>
+            </a:r>
+          </a:p>
+          <a:p>
+            <a:pPr>
+              <a:spcAft>
+                <a:spcPts val="600"/>
+              </a:spcAft>
+              <a:defRPr sz="1100">
+                <a:solidFill>
+                  <a:srgbClr val="CCCCCC"/>
+                </a:solidFill>
+                <a:latin typeface="Segoe UI"/>
+              </a:defRPr>
+            </a:pPr>
+            <a:r>
+              <a:t>🟠 Oracle 11g R2 surdimensionné et coûteux</a:t>
             </a:r>
           </a:p>
         </p:txBody>
@@ -15202,7 +16982,7 @@
         <p:spPr>
           <a:xfrm>
             <a:off x="731520" y="365760"/>
-            <a:ext cx="7315200" cy="640080"/>
+            <a:ext cx="9144000" cy="640080"/>
           </a:xfrm>
           <a:prstGeom prst="rect">
             <a:avLst/>
@@ -15399,8 +17179,8 @@
         </p:nvSpPr>
         <p:spPr>
           <a:xfrm>
-            <a:off x="9601200" y="1234440"/>
-            <a:ext cx="1097280" cy="365760"/>
+            <a:off x="9326880" y="1234440"/>
+            <a:ext cx="1371600" cy="365760"/>
           </a:xfrm>
           <a:prstGeom prst="rect">
             <a:avLst/>
@@ -15553,8 +17333,8 @@
         </p:nvSpPr>
         <p:spPr>
           <a:xfrm>
-            <a:off x="9601200" y="1801368"/>
-            <a:ext cx="1097280" cy="365760"/>
+            <a:off x="9326880" y="1801368"/>
+            <a:ext cx="1371600" cy="365760"/>
           </a:xfrm>
           <a:prstGeom prst="rect">
             <a:avLst/>
@@ -15707,8 +17487,8 @@
         </p:nvSpPr>
         <p:spPr>
           <a:xfrm>
-            <a:off x="9601200" y="2368296"/>
-            <a:ext cx="1097280" cy="365760"/>
+            <a:off x="9326880" y="2368296"/>
+            <a:ext cx="1371600" cy="365760"/>
           </a:xfrm>
           <a:prstGeom prst="rect">
             <a:avLst/>
@@ -15861,8 +17641,8 @@
         </p:nvSpPr>
         <p:spPr>
           <a:xfrm>
-            <a:off x="9601200" y="2935224"/>
-            <a:ext cx="1097280" cy="365760"/>
+            <a:off x="9326880" y="2935224"/>
+            <a:ext cx="1371600" cy="365760"/>
           </a:xfrm>
           <a:prstGeom prst="rect">
             <a:avLst/>
@@ -16015,8 +17795,8 @@
         </p:nvSpPr>
         <p:spPr>
           <a:xfrm>
-            <a:off x="9601200" y="3502152"/>
-            <a:ext cx="1097280" cy="365760"/>
+            <a:off x="9326880" y="3502152"/>
+            <a:ext cx="1371600" cy="365760"/>
           </a:xfrm>
           <a:prstGeom prst="rect">
             <a:avLst/>
@@ -16169,8 +17949,8 @@
         </p:nvSpPr>
         <p:spPr>
           <a:xfrm>
-            <a:off x="9601200" y="4069080"/>
-            <a:ext cx="1097280" cy="365760"/>
+            <a:off x="9326880" y="4069080"/>
+            <a:ext cx="1371600" cy="365760"/>
           </a:xfrm>
           <a:prstGeom prst="rect">
             <a:avLst/>
@@ -16323,8 +18103,8 @@
         </p:nvSpPr>
         <p:spPr>
           <a:xfrm>
-            <a:off x="9601200" y="4636008"/>
-            <a:ext cx="1097280" cy="365760"/>
+            <a:off x="9326880" y="4636008"/>
+            <a:ext cx="1371600" cy="365760"/>
           </a:xfrm>
           <a:prstGeom prst="rect">
             <a:avLst/>
@@ -16477,8 +18257,8 @@
         </p:nvSpPr>
         <p:spPr>
           <a:xfrm>
-            <a:off x="9601200" y="5202936"/>
-            <a:ext cx="1097280" cy="365760"/>
+            <a:off x="9326880" y="5202936"/>
+            <a:ext cx="1371600" cy="365760"/>
           </a:xfrm>
           <a:prstGeom prst="rect">
             <a:avLst/>
@@ -16631,8 +18411,8 @@
         </p:nvSpPr>
         <p:spPr>
           <a:xfrm>
-            <a:off x="9601200" y="5769864"/>
-            <a:ext cx="1097280" cy="365760"/>
+            <a:off x="9326880" y="5769864"/>
+            <a:ext cx="1371600" cy="365760"/>
           </a:xfrm>
           <a:prstGeom prst="rect">
             <a:avLst/>
@@ -18320,7 +20100,7 @@
         <p:spPr>
           <a:xfrm>
             <a:off x="731520" y="365760"/>
-            <a:ext cx="7315200" cy="640080"/>
+            <a:ext cx="9144000" cy="640080"/>
           </a:xfrm>
           <a:prstGeom prst="rect">
             <a:avLst/>

</xml_diff>